<commit_message>
add four condtion stimulus for ChasingDetectionWithRope
</commit_message>
<xml_diff>
--- a/exec/chasingDetectionIntroduction.pptx
+++ b/exec/chasingDetectionIntroduction.pptx
@@ -4,9 +4,16 @@
   <p:sldMasterIdLst>
     <p:sldMasterId id="2147483648" r:id="rId1"/>
   </p:sldMasterIdLst>
+  <p:notesMasterIdLst>
+    <p:notesMasterId r:id="rId8"/>
+  </p:notesMasterIdLst>
   <p:sldIdLst>
     <p:sldId id="272" r:id="rId2"/>
     <p:sldId id="273" r:id="rId3"/>
+    <p:sldId id="274" r:id="rId4"/>
+    <p:sldId id="275" r:id="rId5"/>
+    <p:sldId id="276" r:id="rId6"/>
+    <p:sldId id="277" r:id="rId7"/>
   </p:sldIdLst>
   <p:sldSz cx="12192000" cy="6858000"/>
   <p:notesSz cx="6858000" cy="9144000"/>
@@ -114,6 +121,14 @@
             <p14:sldId id="273"/>
           </p14:sldIdLst>
         </p14:section>
+        <p14:section name="withLine" id="{196F77E0-D3D2-49EF-8891-A1D64FDDA076}">
+          <p14:sldIdLst>
+            <p14:sldId id="274"/>
+            <p14:sldId id="275"/>
+            <p14:sldId id="276"/>
+            <p14:sldId id="277"/>
+          </p14:sldIdLst>
+        </p14:section>
       </p14:sectionLst>
     </p:ext>
     <p:ext uri="{EFAFB233-063F-42B5-8137-9DF3F51BA10A}">
@@ -132,6 +147,523 @@
     </p:ext>
   </p:extLst>
 </p:presentation>
+</file>
+
+<file path=ppt/notesMasters/notesMaster1.xml><?xml version="1.0" encoding="utf-8"?>
+<p:notesMaster xmlns:a="http://schemas.openxmlformats.org/drawingml/2006/main" xmlns:r="http://schemas.openxmlformats.org/officeDocument/2006/relationships" xmlns:p="http://schemas.openxmlformats.org/presentationml/2006/main">
+  <p:cSld>
+    <p:bg>
+      <p:bgRef idx="1001">
+        <a:schemeClr val="bg1"/>
+      </p:bgRef>
+    </p:bg>
+    <p:spTree>
+      <p:nvGrpSpPr>
+        <p:cNvPr id="1" name=""/>
+        <p:cNvGrpSpPr/>
+        <p:nvPr/>
+      </p:nvGrpSpPr>
+      <p:grpSpPr>
+        <a:xfrm>
+          <a:off x="0" y="0"/>
+          <a:ext cx="0" cy="0"/>
+          <a:chOff x="0" y="0"/>
+          <a:chExt cx="0" cy="0"/>
+        </a:xfrm>
+      </p:grpSpPr>
+      <p:sp>
+        <p:nvSpPr>
+          <p:cNvPr id="2" name="页眉占位符 1"/>
+          <p:cNvSpPr>
+            <a:spLocks noGrp="1"/>
+          </p:cNvSpPr>
+          <p:nvPr>
+            <p:ph type="hdr" sz="quarter"/>
+          </p:nvPr>
+        </p:nvSpPr>
+        <p:spPr>
+          <a:xfrm>
+            <a:off x="0" y="0"/>
+            <a:ext cx="2971800" cy="458788"/>
+          </a:xfrm>
+          <a:prstGeom prst="rect">
+            <a:avLst/>
+          </a:prstGeom>
+        </p:spPr>
+        <p:txBody>
+          <a:bodyPr vert="horz" lIns="91440" tIns="45720" rIns="91440" bIns="45720" rtlCol="0"/>
+          <a:lstStyle>
+            <a:lvl1pPr algn="l">
+              <a:defRPr sz="1200"/>
+            </a:lvl1pPr>
+          </a:lstStyle>
+          <a:p>
+            <a:endParaRPr lang="zh-CN" altLang="en-US"/>
+          </a:p>
+        </p:txBody>
+      </p:sp>
+      <p:sp>
+        <p:nvSpPr>
+          <p:cNvPr id="3" name="日期占位符 2"/>
+          <p:cNvSpPr>
+            <a:spLocks noGrp="1"/>
+          </p:cNvSpPr>
+          <p:nvPr>
+            <p:ph type="dt" idx="1"/>
+          </p:nvPr>
+        </p:nvSpPr>
+        <p:spPr>
+          <a:xfrm>
+            <a:off x="3884613" y="0"/>
+            <a:ext cx="2971800" cy="458788"/>
+          </a:xfrm>
+          <a:prstGeom prst="rect">
+            <a:avLst/>
+          </a:prstGeom>
+        </p:spPr>
+        <p:txBody>
+          <a:bodyPr vert="horz" lIns="91440" tIns="45720" rIns="91440" bIns="45720" rtlCol="0"/>
+          <a:lstStyle>
+            <a:lvl1pPr algn="r">
+              <a:defRPr sz="1200"/>
+            </a:lvl1pPr>
+          </a:lstStyle>
+          <a:p>
+            <a:fld id="{CFF59C98-C9BD-41F7-80CC-38D3607D3299}" type="datetimeFigureOut">
+              <a:rPr lang="zh-CN" altLang="en-US" smtClean="0"/>
+              <a:t>2019/8/26</a:t>
+            </a:fld>
+            <a:endParaRPr lang="zh-CN" altLang="en-US"/>
+          </a:p>
+        </p:txBody>
+      </p:sp>
+      <p:sp>
+        <p:nvSpPr>
+          <p:cNvPr id="4" name="幻灯片图像占位符 3"/>
+          <p:cNvSpPr>
+            <a:spLocks noGrp="1" noRot="1" noChangeAspect="1"/>
+          </p:cNvSpPr>
+          <p:nvPr>
+            <p:ph type="sldImg" idx="2"/>
+          </p:nvPr>
+        </p:nvSpPr>
+        <p:spPr>
+          <a:xfrm>
+            <a:off x="685800" y="1143000"/>
+            <a:ext cx="5486400" cy="3086100"/>
+          </a:xfrm>
+          <a:prstGeom prst="rect">
+            <a:avLst/>
+          </a:prstGeom>
+          <a:noFill/>
+          <a:ln w="12700">
+            <a:solidFill>
+              <a:prstClr val="black"/>
+            </a:solidFill>
+          </a:ln>
+        </p:spPr>
+        <p:txBody>
+          <a:bodyPr vert="horz" lIns="91440" tIns="45720" rIns="91440" bIns="45720" rtlCol="0" anchor="ctr"/>
+          <a:lstStyle/>
+          <a:p>
+            <a:endParaRPr lang="zh-CN" altLang="en-US"/>
+          </a:p>
+        </p:txBody>
+      </p:sp>
+      <p:sp>
+        <p:nvSpPr>
+          <p:cNvPr id="5" name="备注占位符 4"/>
+          <p:cNvSpPr>
+            <a:spLocks noGrp="1"/>
+          </p:cNvSpPr>
+          <p:nvPr>
+            <p:ph type="body" sz="quarter" idx="3"/>
+          </p:nvPr>
+        </p:nvSpPr>
+        <p:spPr>
+          <a:xfrm>
+            <a:off x="685800" y="4400550"/>
+            <a:ext cx="5486400" cy="3600450"/>
+          </a:xfrm>
+          <a:prstGeom prst="rect">
+            <a:avLst/>
+          </a:prstGeom>
+        </p:spPr>
+        <p:txBody>
+          <a:bodyPr vert="horz" lIns="91440" tIns="45720" rIns="91440" bIns="45720" rtlCol="0"/>
+          <a:lstStyle/>
+          <a:p>
+            <a:pPr lvl="0"/>
+            <a:r>
+              <a:rPr lang="zh-CN" altLang="en-US"/>
+              <a:t>单击此处编辑母版文本样式</a:t>
+            </a:r>
+          </a:p>
+          <a:p>
+            <a:pPr lvl="1"/>
+            <a:r>
+              <a:rPr lang="zh-CN" altLang="en-US"/>
+              <a:t>二级</a:t>
+            </a:r>
+          </a:p>
+          <a:p>
+            <a:pPr lvl="2"/>
+            <a:r>
+              <a:rPr lang="zh-CN" altLang="en-US"/>
+              <a:t>三级</a:t>
+            </a:r>
+          </a:p>
+          <a:p>
+            <a:pPr lvl="3"/>
+            <a:r>
+              <a:rPr lang="zh-CN" altLang="en-US"/>
+              <a:t>四级</a:t>
+            </a:r>
+          </a:p>
+          <a:p>
+            <a:pPr lvl="4"/>
+            <a:r>
+              <a:rPr lang="zh-CN" altLang="en-US"/>
+              <a:t>五级</a:t>
+            </a:r>
+          </a:p>
+        </p:txBody>
+      </p:sp>
+      <p:sp>
+        <p:nvSpPr>
+          <p:cNvPr id="6" name="页脚占位符 5"/>
+          <p:cNvSpPr>
+            <a:spLocks noGrp="1"/>
+          </p:cNvSpPr>
+          <p:nvPr>
+            <p:ph type="ftr" sz="quarter" idx="4"/>
+          </p:nvPr>
+        </p:nvSpPr>
+        <p:spPr>
+          <a:xfrm>
+            <a:off x="0" y="8685213"/>
+            <a:ext cx="2971800" cy="458787"/>
+          </a:xfrm>
+          <a:prstGeom prst="rect">
+            <a:avLst/>
+          </a:prstGeom>
+        </p:spPr>
+        <p:txBody>
+          <a:bodyPr vert="horz" lIns="91440" tIns="45720" rIns="91440" bIns="45720" rtlCol="0" anchor="b"/>
+          <a:lstStyle>
+            <a:lvl1pPr algn="l">
+              <a:defRPr sz="1200"/>
+            </a:lvl1pPr>
+          </a:lstStyle>
+          <a:p>
+            <a:endParaRPr lang="zh-CN" altLang="en-US"/>
+          </a:p>
+        </p:txBody>
+      </p:sp>
+      <p:sp>
+        <p:nvSpPr>
+          <p:cNvPr id="7" name="灯片编号占位符 6"/>
+          <p:cNvSpPr>
+            <a:spLocks noGrp="1"/>
+          </p:cNvSpPr>
+          <p:nvPr>
+            <p:ph type="sldNum" sz="quarter" idx="5"/>
+          </p:nvPr>
+        </p:nvSpPr>
+        <p:spPr>
+          <a:xfrm>
+            <a:off x="3884613" y="8685213"/>
+            <a:ext cx="2971800" cy="458787"/>
+          </a:xfrm>
+          <a:prstGeom prst="rect">
+            <a:avLst/>
+          </a:prstGeom>
+        </p:spPr>
+        <p:txBody>
+          <a:bodyPr vert="horz" lIns="91440" tIns="45720" rIns="91440" bIns="45720" rtlCol="0" anchor="b"/>
+          <a:lstStyle>
+            <a:lvl1pPr algn="r">
+              <a:defRPr sz="1200"/>
+            </a:lvl1pPr>
+          </a:lstStyle>
+          <a:p>
+            <a:fld id="{5D06C5D5-5119-47B0-896C-5F4E377EE1C9}" type="slidenum">
+              <a:rPr lang="zh-CN" altLang="en-US" smtClean="0"/>
+              <a:t>‹#›</a:t>
+            </a:fld>
+            <a:endParaRPr lang="zh-CN" altLang="en-US"/>
+          </a:p>
+        </p:txBody>
+      </p:sp>
+    </p:spTree>
+    <p:extLst>
+      <p:ext uri="{BB962C8B-B14F-4D97-AF65-F5344CB8AC3E}">
+        <p14:creationId xmlns:p14="http://schemas.microsoft.com/office/powerpoint/2010/main" val="3032993557"/>
+      </p:ext>
+    </p:extLst>
+  </p:cSld>
+  <p:clrMap bg1="lt1" tx1="dk1" bg2="lt2" tx2="dk2" accent1="accent1" accent2="accent2" accent3="accent3" accent4="accent4" accent5="accent5" accent6="accent6" hlink="hlink" folHlink="folHlink"/>
+  <p:notesStyle>
+    <a:lvl1pPr marL="0" algn="l" defTabSz="914400" rtl="0" eaLnBrk="1" latinLnBrk="0" hangingPunct="1">
+      <a:defRPr sz="1200" kern="1200">
+        <a:solidFill>
+          <a:schemeClr val="tx1"/>
+        </a:solidFill>
+        <a:latin typeface="+mn-lt"/>
+        <a:ea typeface="+mn-ea"/>
+        <a:cs typeface="+mn-cs"/>
+      </a:defRPr>
+    </a:lvl1pPr>
+    <a:lvl2pPr marL="457200" algn="l" defTabSz="914400" rtl="0" eaLnBrk="1" latinLnBrk="0" hangingPunct="1">
+      <a:defRPr sz="1200" kern="1200">
+        <a:solidFill>
+          <a:schemeClr val="tx1"/>
+        </a:solidFill>
+        <a:latin typeface="+mn-lt"/>
+        <a:ea typeface="+mn-ea"/>
+        <a:cs typeface="+mn-cs"/>
+      </a:defRPr>
+    </a:lvl2pPr>
+    <a:lvl3pPr marL="914400" algn="l" defTabSz="914400" rtl="0" eaLnBrk="1" latinLnBrk="0" hangingPunct="1">
+      <a:defRPr sz="1200" kern="1200">
+        <a:solidFill>
+          <a:schemeClr val="tx1"/>
+        </a:solidFill>
+        <a:latin typeface="+mn-lt"/>
+        <a:ea typeface="+mn-ea"/>
+        <a:cs typeface="+mn-cs"/>
+      </a:defRPr>
+    </a:lvl3pPr>
+    <a:lvl4pPr marL="1371600" algn="l" defTabSz="914400" rtl="0" eaLnBrk="1" latinLnBrk="0" hangingPunct="1">
+      <a:defRPr sz="1200" kern="1200">
+        <a:solidFill>
+          <a:schemeClr val="tx1"/>
+        </a:solidFill>
+        <a:latin typeface="+mn-lt"/>
+        <a:ea typeface="+mn-ea"/>
+        <a:cs typeface="+mn-cs"/>
+      </a:defRPr>
+    </a:lvl4pPr>
+    <a:lvl5pPr marL="1828800" algn="l" defTabSz="914400" rtl="0" eaLnBrk="1" latinLnBrk="0" hangingPunct="1">
+      <a:defRPr sz="1200" kern="1200">
+        <a:solidFill>
+          <a:schemeClr val="tx1"/>
+        </a:solidFill>
+        <a:latin typeface="+mn-lt"/>
+        <a:ea typeface="+mn-ea"/>
+        <a:cs typeface="+mn-cs"/>
+      </a:defRPr>
+    </a:lvl5pPr>
+    <a:lvl6pPr marL="2286000" algn="l" defTabSz="914400" rtl="0" eaLnBrk="1" latinLnBrk="0" hangingPunct="1">
+      <a:defRPr sz="1200" kern="1200">
+        <a:solidFill>
+          <a:schemeClr val="tx1"/>
+        </a:solidFill>
+        <a:latin typeface="+mn-lt"/>
+        <a:ea typeface="+mn-ea"/>
+        <a:cs typeface="+mn-cs"/>
+      </a:defRPr>
+    </a:lvl6pPr>
+    <a:lvl7pPr marL="2743200" algn="l" defTabSz="914400" rtl="0" eaLnBrk="1" latinLnBrk="0" hangingPunct="1">
+      <a:defRPr sz="1200" kern="1200">
+        <a:solidFill>
+          <a:schemeClr val="tx1"/>
+        </a:solidFill>
+        <a:latin typeface="+mn-lt"/>
+        <a:ea typeface="+mn-ea"/>
+        <a:cs typeface="+mn-cs"/>
+      </a:defRPr>
+    </a:lvl7pPr>
+    <a:lvl8pPr marL="3200400" algn="l" defTabSz="914400" rtl="0" eaLnBrk="1" latinLnBrk="0" hangingPunct="1">
+      <a:defRPr sz="1200" kern="1200">
+        <a:solidFill>
+          <a:schemeClr val="tx1"/>
+        </a:solidFill>
+        <a:latin typeface="+mn-lt"/>
+        <a:ea typeface="+mn-ea"/>
+        <a:cs typeface="+mn-cs"/>
+      </a:defRPr>
+    </a:lvl8pPr>
+    <a:lvl9pPr marL="3657600" algn="l" defTabSz="914400" rtl="0" eaLnBrk="1" latinLnBrk="0" hangingPunct="1">
+      <a:defRPr sz="1200" kern="1200">
+        <a:solidFill>
+          <a:schemeClr val="tx1"/>
+        </a:solidFill>
+        <a:latin typeface="+mn-lt"/>
+        <a:ea typeface="+mn-ea"/>
+        <a:cs typeface="+mn-cs"/>
+      </a:defRPr>
+    </a:lvl9pPr>
+  </p:notesStyle>
+</p:notesMaster>
+</file>
+
+<file path=ppt/notesSlides/notesSlide1.xml><?xml version="1.0" encoding="utf-8"?>
+<p:notes xmlns:a="http://schemas.openxmlformats.org/drawingml/2006/main" xmlns:r="http://schemas.openxmlformats.org/officeDocument/2006/relationships" xmlns:p="http://schemas.openxmlformats.org/presentationml/2006/main">
+  <p:cSld>
+    <p:spTree>
+      <p:nvGrpSpPr>
+        <p:cNvPr id="1" name=""/>
+        <p:cNvGrpSpPr/>
+        <p:nvPr/>
+      </p:nvGrpSpPr>
+      <p:grpSpPr>
+        <a:xfrm>
+          <a:off x="0" y="0"/>
+          <a:ext cx="0" cy="0"/>
+          <a:chOff x="0" y="0"/>
+          <a:chExt cx="0" cy="0"/>
+        </a:xfrm>
+      </p:grpSpPr>
+      <p:sp>
+        <p:nvSpPr>
+          <p:cNvPr id="2" name="幻灯片图像占位符 1"/>
+          <p:cNvSpPr>
+            <a:spLocks noGrp="1" noRot="1" noChangeAspect="1"/>
+          </p:cNvSpPr>
+          <p:nvPr>
+            <p:ph type="sldImg"/>
+          </p:nvPr>
+        </p:nvSpPr>
+        <p:spPr/>
+      </p:sp>
+      <p:sp>
+        <p:nvSpPr>
+          <p:cNvPr id="3" name="备注占位符 2"/>
+          <p:cNvSpPr>
+            <a:spLocks noGrp="1"/>
+          </p:cNvSpPr>
+          <p:nvPr>
+            <p:ph type="body" idx="1"/>
+          </p:nvPr>
+        </p:nvSpPr>
+        <p:spPr/>
+        <p:txBody>
+          <a:bodyPr/>
+          <a:lstStyle/>
+          <a:p>
+            <a:endParaRPr lang="zh-CN" altLang="en-US" dirty="0"/>
+          </a:p>
+        </p:txBody>
+      </p:sp>
+      <p:sp>
+        <p:nvSpPr>
+          <p:cNvPr id="4" name="灯片编号占位符 3"/>
+          <p:cNvSpPr>
+            <a:spLocks noGrp="1"/>
+          </p:cNvSpPr>
+          <p:nvPr>
+            <p:ph type="sldNum" sz="quarter" idx="5"/>
+          </p:nvPr>
+        </p:nvSpPr>
+        <p:spPr/>
+        <p:txBody>
+          <a:bodyPr/>
+          <a:lstStyle/>
+          <a:p>
+            <a:fld id="{5D06C5D5-5119-47B0-896C-5F4E377EE1C9}" type="slidenum">
+              <a:rPr lang="zh-CN" altLang="en-US" smtClean="0"/>
+              <a:t>1</a:t>
+            </a:fld>
+            <a:endParaRPr lang="zh-CN" altLang="en-US"/>
+          </a:p>
+        </p:txBody>
+      </p:sp>
+    </p:spTree>
+    <p:extLst>
+      <p:ext uri="{BB962C8B-B14F-4D97-AF65-F5344CB8AC3E}">
+        <p14:creationId xmlns:p14="http://schemas.microsoft.com/office/powerpoint/2010/main" val="1833473573"/>
+      </p:ext>
+    </p:extLst>
+  </p:cSld>
+  <p:clrMapOvr>
+    <a:masterClrMapping/>
+  </p:clrMapOvr>
+</p:notes>
+</file>
+
+<file path=ppt/notesSlides/notesSlide2.xml><?xml version="1.0" encoding="utf-8"?>
+<p:notes xmlns:a="http://schemas.openxmlformats.org/drawingml/2006/main" xmlns:r="http://schemas.openxmlformats.org/officeDocument/2006/relationships" xmlns:p="http://schemas.openxmlformats.org/presentationml/2006/main">
+  <p:cSld>
+    <p:spTree>
+      <p:nvGrpSpPr>
+        <p:cNvPr id="1" name=""/>
+        <p:cNvGrpSpPr/>
+        <p:nvPr/>
+      </p:nvGrpSpPr>
+      <p:grpSpPr>
+        <a:xfrm>
+          <a:off x="0" y="0"/>
+          <a:ext cx="0" cy="0"/>
+          <a:chOff x="0" y="0"/>
+          <a:chExt cx="0" cy="0"/>
+        </a:xfrm>
+      </p:grpSpPr>
+      <p:sp>
+        <p:nvSpPr>
+          <p:cNvPr id="2" name="幻灯片图像占位符 1"/>
+          <p:cNvSpPr>
+            <a:spLocks noGrp="1" noRot="1" noChangeAspect="1"/>
+          </p:cNvSpPr>
+          <p:nvPr>
+            <p:ph type="sldImg"/>
+          </p:nvPr>
+        </p:nvSpPr>
+        <p:spPr/>
+      </p:sp>
+      <p:sp>
+        <p:nvSpPr>
+          <p:cNvPr id="3" name="备注占位符 2"/>
+          <p:cNvSpPr>
+            <a:spLocks noGrp="1"/>
+          </p:cNvSpPr>
+          <p:nvPr>
+            <p:ph type="body" idx="1"/>
+          </p:nvPr>
+        </p:nvSpPr>
+        <p:spPr/>
+        <p:txBody>
+          <a:bodyPr/>
+          <a:lstStyle/>
+          <a:p>
+            <a:endParaRPr lang="zh-CN" altLang="en-US" dirty="0"/>
+          </a:p>
+        </p:txBody>
+      </p:sp>
+      <p:sp>
+        <p:nvSpPr>
+          <p:cNvPr id="4" name="灯片编号占位符 3"/>
+          <p:cNvSpPr>
+            <a:spLocks noGrp="1"/>
+          </p:cNvSpPr>
+          <p:nvPr>
+            <p:ph type="sldNum" sz="quarter" idx="5"/>
+          </p:nvPr>
+        </p:nvSpPr>
+        <p:spPr/>
+        <p:txBody>
+          <a:bodyPr/>
+          <a:lstStyle/>
+          <a:p>
+            <a:fld id="{5D06C5D5-5119-47B0-896C-5F4E377EE1C9}" type="slidenum">
+              <a:rPr lang="zh-CN" altLang="en-US" smtClean="0"/>
+              <a:t>3</a:t>
+            </a:fld>
+            <a:endParaRPr lang="zh-CN" altLang="en-US"/>
+          </a:p>
+        </p:txBody>
+      </p:sp>
+    </p:spTree>
+    <p:extLst>
+      <p:ext uri="{BB962C8B-B14F-4D97-AF65-F5344CB8AC3E}">
+        <p14:creationId xmlns:p14="http://schemas.microsoft.com/office/powerpoint/2010/main" val="3665239114"/>
+      </p:ext>
+    </p:extLst>
+  </p:cSld>
+  <p:clrMapOvr>
+    <a:masterClrMapping/>
+  </p:clrMapOvr>
+</p:notes>
 </file>
 
 <file path=ppt/slideLayouts/slideLayout1.xml><?xml version="1.0" encoding="utf-8"?>
@@ -281,7 +813,7 @@
           <a:p>
             <a:fld id="{597785CE-28E9-41AA-907C-478FE12C818B}" type="datetimeFigureOut">
               <a:rPr lang="zh-CN" altLang="en-US" smtClean="0"/>
-              <a:t>2019/8/25</a:t>
+              <a:t>2019/8/26</a:t>
             </a:fld>
             <a:endParaRPr lang="zh-CN" altLang="en-US"/>
           </a:p>
@@ -479,7 +1011,7 @@
           <a:p>
             <a:fld id="{597785CE-28E9-41AA-907C-478FE12C818B}" type="datetimeFigureOut">
               <a:rPr lang="zh-CN" altLang="en-US" smtClean="0"/>
-              <a:t>2019/8/25</a:t>
+              <a:t>2019/8/26</a:t>
             </a:fld>
             <a:endParaRPr lang="zh-CN" altLang="en-US"/>
           </a:p>
@@ -687,7 +1219,7 @@
           <a:p>
             <a:fld id="{597785CE-28E9-41AA-907C-478FE12C818B}" type="datetimeFigureOut">
               <a:rPr lang="zh-CN" altLang="en-US" smtClean="0"/>
-              <a:t>2019/8/25</a:t>
+              <a:t>2019/8/26</a:t>
             </a:fld>
             <a:endParaRPr lang="zh-CN" altLang="en-US"/>
           </a:p>
@@ -885,7 +1417,7 @@
           <a:p>
             <a:fld id="{597785CE-28E9-41AA-907C-478FE12C818B}" type="datetimeFigureOut">
               <a:rPr lang="zh-CN" altLang="en-US" smtClean="0"/>
-              <a:t>2019/8/25</a:t>
+              <a:t>2019/8/26</a:t>
             </a:fld>
             <a:endParaRPr lang="zh-CN" altLang="en-US"/>
           </a:p>
@@ -1160,7 +1692,7 @@
           <a:p>
             <a:fld id="{597785CE-28E9-41AA-907C-478FE12C818B}" type="datetimeFigureOut">
               <a:rPr lang="zh-CN" altLang="en-US" smtClean="0"/>
-              <a:t>2019/8/25</a:t>
+              <a:t>2019/8/26</a:t>
             </a:fld>
             <a:endParaRPr lang="zh-CN" altLang="en-US"/>
           </a:p>
@@ -1425,7 +1957,7 @@
           <a:p>
             <a:fld id="{597785CE-28E9-41AA-907C-478FE12C818B}" type="datetimeFigureOut">
               <a:rPr lang="zh-CN" altLang="en-US" smtClean="0"/>
-              <a:t>2019/8/25</a:t>
+              <a:t>2019/8/26</a:t>
             </a:fld>
             <a:endParaRPr lang="zh-CN" altLang="en-US"/>
           </a:p>
@@ -1837,7 +2369,7 @@
           <a:p>
             <a:fld id="{597785CE-28E9-41AA-907C-478FE12C818B}" type="datetimeFigureOut">
               <a:rPr lang="zh-CN" altLang="en-US" smtClean="0"/>
-              <a:t>2019/8/25</a:t>
+              <a:t>2019/8/26</a:t>
             </a:fld>
             <a:endParaRPr lang="zh-CN" altLang="en-US"/>
           </a:p>
@@ -1978,7 +2510,7 @@
           <a:p>
             <a:fld id="{597785CE-28E9-41AA-907C-478FE12C818B}" type="datetimeFigureOut">
               <a:rPr lang="zh-CN" altLang="en-US" smtClean="0"/>
-              <a:t>2019/8/25</a:t>
+              <a:t>2019/8/26</a:t>
             </a:fld>
             <a:endParaRPr lang="zh-CN" altLang="en-US"/>
           </a:p>
@@ -2091,7 +2623,7 @@
           <a:p>
             <a:fld id="{597785CE-28E9-41AA-907C-478FE12C818B}" type="datetimeFigureOut">
               <a:rPr lang="zh-CN" altLang="en-US" smtClean="0"/>
-              <a:t>2019/8/25</a:t>
+              <a:t>2019/8/26</a:t>
             </a:fld>
             <a:endParaRPr lang="zh-CN" altLang="en-US"/>
           </a:p>
@@ -2402,7 +2934,7 @@
           <a:p>
             <a:fld id="{597785CE-28E9-41AA-907C-478FE12C818B}" type="datetimeFigureOut">
               <a:rPr lang="zh-CN" altLang="en-US" smtClean="0"/>
-              <a:t>2019/8/25</a:t>
+              <a:t>2019/8/26</a:t>
             </a:fld>
             <a:endParaRPr lang="zh-CN" altLang="en-US"/>
           </a:p>
@@ -2690,7 +3222,7 @@
           <a:p>
             <a:fld id="{597785CE-28E9-41AA-907C-478FE12C818B}" type="datetimeFigureOut">
               <a:rPr lang="zh-CN" altLang="en-US" smtClean="0"/>
-              <a:t>2019/8/25</a:t>
+              <a:t>2019/8/26</a:t>
             </a:fld>
             <a:endParaRPr lang="zh-CN" altLang="en-US"/>
           </a:p>
@@ -2931,7 +3463,7 @@
           <a:p>
             <a:fld id="{597785CE-28E9-41AA-907C-478FE12C818B}" type="datetimeFigureOut">
               <a:rPr lang="zh-CN" altLang="en-US" smtClean="0"/>
-              <a:t>2019/8/25</a:t>
+              <a:t>2019/8/26</a:t>
             </a:fld>
             <a:endParaRPr lang="zh-CN" altLang="en-US"/>
           </a:p>
@@ -3416,7 +3948,7 @@
             <a:lstStyle/>
             <a:p>
               <a:pPr algn="ctr"/>
-              <a:endParaRPr kumimoji="1" lang="zh-CN" altLang="en-US"/>
+              <a:endParaRPr kumimoji="1" lang="zh-CN" altLang="en-US" dirty="0"/>
             </a:p>
           </p:txBody>
         </p:sp>
@@ -3728,6 +4260,100 @@
             <a:xfrm rot="5400000" flipH="1" flipV="1">
               <a:off x="1569265" y="1226393"/>
               <a:ext cx="128164" cy="152097"/>
+            </a:xfrm>
+            <a:prstGeom prst="curvedConnector2">
+              <a:avLst/>
+            </a:prstGeom>
+            <a:ln>
+              <a:tailEnd type="triangle"/>
+            </a:ln>
+          </p:spPr>
+          <p:style>
+            <a:lnRef idx="1">
+              <a:schemeClr val="dk1"/>
+            </a:lnRef>
+            <a:fillRef idx="0">
+              <a:schemeClr val="dk1"/>
+            </a:fillRef>
+            <a:effectRef idx="0">
+              <a:schemeClr val="dk1"/>
+            </a:effectRef>
+            <a:fontRef idx="minor">
+              <a:schemeClr val="tx1"/>
+            </a:fontRef>
+          </p:style>
+        </p:cxnSp>
+        <p:sp>
+          <p:nvSpPr>
+            <p:cNvPr id="24" name="椭圆 23">
+              <a:extLst>
+                <a:ext uri="{FF2B5EF4-FFF2-40B4-BE49-F238E27FC236}">
+                  <a16:creationId xmlns:a16="http://schemas.microsoft.com/office/drawing/2014/main" id="{2DD61F66-CF39-48E6-ABBF-9ADDEA68B4CB}"/>
+                </a:ext>
+              </a:extLst>
+            </p:cNvPr>
+            <p:cNvSpPr/>
+            <p:nvPr/>
+          </p:nvSpPr>
+          <p:spPr>
+            <a:xfrm>
+              <a:off x="1348044" y="1621160"/>
+              <a:ext cx="158044" cy="158044"/>
+            </a:xfrm>
+            <a:prstGeom prst="ellipse">
+              <a:avLst/>
+            </a:prstGeom>
+            <a:solidFill>
+              <a:srgbClr val="7030A0"/>
+            </a:solidFill>
+            <a:ln>
+              <a:noFill/>
+            </a:ln>
+          </p:spPr>
+          <p:style>
+            <a:lnRef idx="2">
+              <a:schemeClr val="accent1">
+                <a:shade val="50000"/>
+              </a:schemeClr>
+            </a:lnRef>
+            <a:fillRef idx="1">
+              <a:schemeClr val="accent1"/>
+            </a:fillRef>
+            <a:effectRef idx="0">
+              <a:schemeClr val="accent1"/>
+            </a:effectRef>
+            <a:fontRef idx="minor">
+              <a:schemeClr val="lt1"/>
+            </a:fontRef>
+          </p:style>
+          <p:txBody>
+            <a:bodyPr rtlCol="0" anchor="ctr"/>
+            <a:lstStyle/>
+            <a:p>
+              <a:pPr algn="ctr"/>
+              <a:endParaRPr kumimoji="1" lang="zh-CN" altLang="en-US"/>
+            </a:p>
+          </p:txBody>
+        </p:sp>
+        <p:cxnSp>
+          <p:nvCxnSpPr>
+            <p:cNvPr id="25" name="曲线连接符 10">
+              <a:extLst>
+                <a:ext uri="{FF2B5EF4-FFF2-40B4-BE49-F238E27FC236}">
+                  <a16:creationId xmlns:a16="http://schemas.microsoft.com/office/drawing/2014/main" id="{5FE1FAD0-607E-44B8-8061-E0D5043CF8AA}"/>
+                </a:ext>
+              </a:extLst>
+            </p:cNvPr>
+            <p:cNvCxnSpPr>
+              <a:cxnSpLocks/>
+              <a:stCxn id="24" idx="7"/>
+            </p:cNvCxnSpPr>
+            <p:nvPr/>
+          </p:nvCxnSpPr>
+          <p:spPr>
+            <a:xfrm rot="5400000" flipH="1" flipV="1">
+              <a:off x="1554159" y="1468705"/>
+              <a:ext cx="104385" cy="246816"/>
             </a:xfrm>
             <a:prstGeom prst="curvedConnector2">
               <a:avLst/>
@@ -5786,10 +6412,2995 @@
           </a:p>
         </p:txBody>
       </p:sp>
+      <p:sp>
+        <p:nvSpPr>
+          <p:cNvPr id="20" name="椭圆 19">
+            <a:extLst>
+              <a:ext uri="{FF2B5EF4-FFF2-40B4-BE49-F238E27FC236}">
+                <a16:creationId xmlns:a16="http://schemas.microsoft.com/office/drawing/2014/main" id="{5FA66AD3-163E-4636-B7C9-2CF266A5A2A9}"/>
+              </a:ext>
+            </a:extLst>
+          </p:cNvPr>
+          <p:cNvSpPr/>
+          <p:nvPr/>
+        </p:nvSpPr>
+        <p:spPr>
+          <a:xfrm>
+            <a:off x="3150597" y="4334775"/>
+            <a:ext cx="273014" cy="273014"/>
+          </a:xfrm>
+          <a:prstGeom prst="ellipse">
+            <a:avLst/>
+          </a:prstGeom>
+          <a:solidFill>
+            <a:srgbClr val="7030A0"/>
+          </a:solidFill>
+          <a:ln>
+            <a:noFill/>
+          </a:ln>
+        </p:spPr>
+        <p:style>
+          <a:lnRef idx="2">
+            <a:schemeClr val="accent1">
+              <a:shade val="50000"/>
+            </a:schemeClr>
+          </a:lnRef>
+          <a:fillRef idx="1">
+            <a:schemeClr val="accent1"/>
+          </a:fillRef>
+          <a:effectRef idx="0">
+            <a:schemeClr val="accent1"/>
+          </a:effectRef>
+          <a:fontRef idx="minor">
+            <a:schemeClr val="lt1"/>
+          </a:fontRef>
+        </p:style>
+        <p:txBody>
+          <a:bodyPr rtlCol="0" anchor="ctr"/>
+          <a:lstStyle/>
+          <a:p>
+            <a:pPr algn="ctr"/>
+            <a:endParaRPr kumimoji="1" lang="zh-CN" altLang="en-US"/>
+          </a:p>
+        </p:txBody>
+      </p:sp>
+      <p:sp>
+        <p:nvSpPr>
+          <p:cNvPr id="21" name="椭圆 20">
+            <a:extLst>
+              <a:ext uri="{FF2B5EF4-FFF2-40B4-BE49-F238E27FC236}">
+                <a16:creationId xmlns:a16="http://schemas.microsoft.com/office/drawing/2014/main" id="{C17927E5-7DAF-48B2-8829-25F361657E89}"/>
+              </a:ext>
+            </a:extLst>
+          </p:cNvPr>
+          <p:cNvSpPr/>
+          <p:nvPr/>
+        </p:nvSpPr>
+        <p:spPr>
+          <a:xfrm>
+            <a:off x="7667594" y="4324585"/>
+            <a:ext cx="273014" cy="273014"/>
+          </a:xfrm>
+          <a:prstGeom prst="ellipse">
+            <a:avLst/>
+          </a:prstGeom>
+          <a:solidFill>
+            <a:srgbClr val="7030A0"/>
+          </a:solidFill>
+          <a:ln>
+            <a:noFill/>
+          </a:ln>
+        </p:spPr>
+        <p:style>
+          <a:lnRef idx="2">
+            <a:schemeClr val="accent1">
+              <a:shade val="50000"/>
+            </a:schemeClr>
+          </a:lnRef>
+          <a:fillRef idx="1">
+            <a:schemeClr val="accent1"/>
+          </a:fillRef>
+          <a:effectRef idx="0">
+            <a:schemeClr val="accent1"/>
+          </a:effectRef>
+          <a:fontRef idx="minor">
+            <a:schemeClr val="lt1"/>
+          </a:fontRef>
+        </p:style>
+        <p:txBody>
+          <a:bodyPr rtlCol="0" anchor="ctr"/>
+          <a:lstStyle/>
+          <a:p>
+            <a:pPr algn="ctr"/>
+            <a:endParaRPr kumimoji="1" lang="zh-CN" altLang="en-US"/>
+          </a:p>
+        </p:txBody>
+      </p:sp>
     </p:spTree>
     <p:extLst>
       <p:ext uri="{BB962C8B-B14F-4D97-AF65-F5344CB8AC3E}">
         <p14:creationId xmlns:p14="http://schemas.microsoft.com/office/powerpoint/2010/main" val="3833164611"/>
+      </p:ext>
+    </p:extLst>
+  </p:cSld>
+  <p:clrMapOvr>
+    <a:masterClrMapping/>
+  </p:clrMapOvr>
+</p:sld>
+</file>
+
+<file path=ppt/slides/slide3.xml><?xml version="1.0" encoding="utf-8"?>
+<p:sld xmlns:a="http://schemas.openxmlformats.org/drawingml/2006/main" xmlns:r="http://schemas.openxmlformats.org/officeDocument/2006/relationships" xmlns:p="http://schemas.openxmlformats.org/presentationml/2006/main">
+  <p:cSld>
+    <p:spTree>
+      <p:nvGrpSpPr>
+        <p:cNvPr id="1" name=""/>
+        <p:cNvGrpSpPr/>
+        <p:nvPr/>
+      </p:nvGrpSpPr>
+      <p:grpSpPr>
+        <a:xfrm>
+          <a:off x="0" y="0"/>
+          <a:ext cx="0" cy="0"/>
+          <a:chOff x="0" y="0"/>
+          <a:chExt cx="0" cy="0"/>
+        </a:xfrm>
+      </p:grpSpPr>
+      <p:grpSp>
+        <p:nvGrpSpPr>
+          <p:cNvPr id="15" name="组合 14">
+            <a:extLst>
+              <a:ext uri="{FF2B5EF4-FFF2-40B4-BE49-F238E27FC236}">
+                <a16:creationId xmlns:a16="http://schemas.microsoft.com/office/drawing/2014/main" id="{6355A9F4-E640-A046-80CD-2A59DB2F26AC}"/>
+              </a:ext>
+            </a:extLst>
+          </p:cNvPr>
+          <p:cNvGrpSpPr/>
+          <p:nvPr/>
+        </p:nvGrpSpPr>
+        <p:grpSpPr>
+          <a:xfrm>
+            <a:off x="2047520" y="563669"/>
+            <a:ext cx="1964266" cy="1580445"/>
+            <a:chOff x="812800" y="824088"/>
+            <a:chExt cx="1964266" cy="1580445"/>
+          </a:xfrm>
+        </p:grpSpPr>
+        <p:sp>
+          <p:nvSpPr>
+            <p:cNvPr id="3" name="矩形 2">
+              <a:extLst>
+                <a:ext uri="{FF2B5EF4-FFF2-40B4-BE49-F238E27FC236}">
+                  <a16:creationId xmlns:a16="http://schemas.microsoft.com/office/drawing/2014/main" id="{99FF37D0-0A63-AF4B-90C1-40A7116408E1}"/>
+                </a:ext>
+              </a:extLst>
+            </p:cNvPr>
+            <p:cNvSpPr/>
+            <p:nvPr/>
+          </p:nvSpPr>
+          <p:spPr>
+            <a:xfrm>
+              <a:off x="812800" y="824088"/>
+              <a:ext cx="1964266" cy="1580445"/>
+            </a:xfrm>
+            <a:prstGeom prst="rect">
+              <a:avLst/>
+            </a:prstGeom>
+            <a:solidFill>
+              <a:srgbClr val="808080"/>
+            </a:solidFill>
+            <a:ln>
+              <a:noFill/>
+            </a:ln>
+          </p:spPr>
+          <p:style>
+            <a:lnRef idx="2">
+              <a:schemeClr val="accent1">
+                <a:shade val="50000"/>
+              </a:schemeClr>
+            </a:lnRef>
+            <a:fillRef idx="1">
+              <a:schemeClr val="accent1"/>
+            </a:fillRef>
+            <a:effectRef idx="0">
+              <a:schemeClr val="accent1"/>
+            </a:effectRef>
+            <a:fontRef idx="minor">
+              <a:schemeClr val="lt1"/>
+            </a:fontRef>
+          </p:style>
+          <p:txBody>
+            <a:bodyPr rtlCol="0" anchor="ctr"/>
+            <a:lstStyle/>
+            <a:p>
+              <a:pPr algn="ctr"/>
+              <a:endParaRPr kumimoji="1" lang="zh-CN" altLang="en-US" dirty="0"/>
+            </a:p>
+          </p:txBody>
+        </p:sp>
+        <p:sp>
+          <p:nvSpPr>
+            <p:cNvPr id="4" name="矩形 3">
+              <a:extLst>
+                <a:ext uri="{FF2B5EF4-FFF2-40B4-BE49-F238E27FC236}">
+                  <a16:creationId xmlns:a16="http://schemas.microsoft.com/office/drawing/2014/main" id="{CCE14611-91B9-E14E-AC51-E866CA595AA1}"/>
+                </a:ext>
+              </a:extLst>
+            </p:cNvPr>
+            <p:cNvSpPr/>
+            <p:nvPr/>
+          </p:nvSpPr>
+          <p:spPr>
+            <a:xfrm>
+              <a:off x="1230489" y="1106310"/>
+              <a:ext cx="1140178" cy="1004712"/>
+            </a:xfrm>
+            <a:prstGeom prst="rect">
+              <a:avLst/>
+            </a:prstGeom>
+            <a:noFill/>
+            <a:ln>
+              <a:solidFill>
+                <a:schemeClr val="tx1"/>
+              </a:solidFill>
+            </a:ln>
+          </p:spPr>
+          <p:style>
+            <a:lnRef idx="2">
+              <a:schemeClr val="accent1">
+                <a:shade val="50000"/>
+              </a:schemeClr>
+            </a:lnRef>
+            <a:fillRef idx="1">
+              <a:schemeClr val="accent1"/>
+            </a:fillRef>
+            <a:effectRef idx="0">
+              <a:schemeClr val="accent1"/>
+            </a:effectRef>
+            <a:fontRef idx="minor">
+              <a:schemeClr val="lt1"/>
+            </a:fontRef>
+          </p:style>
+          <p:txBody>
+            <a:bodyPr rtlCol="0" anchor="ctr"/>
+            <a:lstStyle/>
+            <a:p>
+              <a:pPr algn="ctr"/>
+              <a:endParaRPr kumimoji="1" lang="zh-CN" altLang="en-US"/>
+            </a:p>
+          </p:txBody>
+        </p:sp>
+        <p:sp>
+          <p:nvSpPr>
+            <p:cNvPr id="5" name="椭圆 4">
+              <a:extLst>
+                <a:ext uri="{FF2B5EF4-FFF2-40B4-BE49-F238E27FC236}">
+                  <a16:creationId xmlns:a16="http://schemas.microsoft.com/office/drawing/2014/main" id="{F918044B-F212-A64E-A4E7-03F88872C5E8}"/>
+                </a:ext>
+              </a:extLst>
+            </p:cNvPr>
+            <p:cNvSpPr/>
+            <p:nvPr/>
+          </p:nvSpPr>
+          <p:spPr>
+            <a:xfrm>
+              <a:off x="1422400" y="1343378"/>
+              <a:ext cx="158044" cy="158044"/>
+            </a:xfrm>
+            <a:prstGeom prst="ellipse">
+              <a:avLst/>
+            </a:prstGeom>
+            <a:solidFill>
+              <a:srgbClr val="0070C0"/>
+            </a:solidFill>
+            <a:ln>
+              <a:noFill/>
+            </a:ln>
+          </p:spPr>
+          <p:style>
+            <a:lnRef idx="2">
+              <a:schemeClr val="accent1">
+                <a:shade val="50000"/>
+              </a:schemeClr>
+            </a:lnRef>
+            <a:fillRef idx="1">
+              <a:schemeClr val="accent1"/>
+            </a:fillRef>
+            <a:effectRef idx="0">
+              <a:schemeClr val="accent1"/>
+            </a:effectRef>
+            <a:fontRef idx="minor">
+              <a:schemeClr val="lt1"/>
+            </a:fontRef>
+          </p:style>
+          <p:txBody>
+            <a:bodyPr rtlCol="0" anchor="ctr"/>
+            <a:lstStyle/>
+            <a:p>
+              <a:pPr algn="ctr"/>
+              <a:endParaRPr kumimoji="1" lang="zh-CN" altLang="en-US"/>
+            </a:p>
+          </p:txBody>
+        </p:sp>
+        <p:sp>
+          <p:nvSpPr>
+            <p:cNvPr id="6" name="椭圆 5">
+              <a:extLst>
+                <a:ext uri="{FF2B5EF4-FFF2-40B4-BE49-F238E27FC236}">
+                  <a16:creationId xmlns:a16="http://schemas.microsoft.com/office/drawing/2014/main" id="{AE62F643-E65F-9847-B82C-6961F8328781}"/>
+                </a:ext>
+              </a:extLst>
+            </p:cNvPr>
+            <p:cNvSpPr/>
+            <p:nvPr/>
+          </p:nvSpPr>
+          <p:spPr>
+            <a:xfrm>
+              <a:off x="1676400" y="1800578"/>
+              <a:ext cx="158044" cy="158044"/>
+            </a:xfrm>
+            <a:prstGeom prst="ellipse">
+              <a:avLst/>
+            </a:prstGeom>
+            <a:solidFill>
+              <a:srgbClr val="FFC000"/>
+            </a:solidFill>
+            <a:ln>
+              <a:noFill/>
+            </a:ln>
+          </p:spPr>
+          <p:style>
+            <a:lnRef idx="2">
+              <a:schemeClr val="accent1">
+                <a:shade val="50000"/>
+              </a:schemeClr>
+            </a:lnRef>
+            <a:fillRef idx="1">
+              <a:schemeClr val="accent1"/>
+            </a:fillRef>
+            <a:effectRef idx="0">
+              <a:schemeClr val="accent1"/>
+            </a:effectRef>
+            <a:fontRef idx="minor">
+              <a:schemeClr val="lt1"/>
+            </a:fontRef>
+          </p:style>
+          <p:txBody>
+            <a:bodyPr rtlCol="0" anchor="ctr"/>
+            <a:lstStyle/>
+            <a:p>
+              <a:pPr algn="ctr"/>
+              <a:endParaRPr kumimoji="1" lang="zh-CN" altLang="en-US"/>
+            </a:p>
+          </p:txBody>
+        </p:sp>
+        <p:sp>
+          <p:nvSpPr>
+            <p:cNvPr id="7" name="椭圆 6">
+              <a:extLst>
+                <a:ext uri="{FF2B5EF4-FFF2-40B4-BE49-F238E27FC236}">
+                  <a16:creationId xmlns:a16="http://schemas.microsoft.com/office/drawing/2014/main" id="{A9D88FE4-533B-ED49-8BE8-77CE20BAA0C7}"/>
+                </a:ext>
+              </a:extLst>
+            </p:cNvPr>
+            <p:cNvSpPr/>
+            <p:nvPr/>
+          </p:nvSpPr>
+          <p:spPr>
+            <a:xfrm>
+              <a:off x="1997262" y="1422400"/>
+              <a:ext cx="158044" cy="158044"/>
+            </a:xfrm>
+            <a:prstGeom prst="ellipse">
+              <a:avLst/>
+            </a:prstGeom>
+            <a:solidFill>
+              <a:srgbClr val="00B050"/>
+            </a:solidFill>
+            <a:ln>
+              <a:noFill/>
+            </a:ln>
+          </p:spPr>
+          <p:style>
+            <a:lnRef idx="2">
+              <a:schemeClr val="accent1">
+                <a:shade val="50000"/>
+              </a:schemeClr>
+            </a:lnRef>
+            <a:fillRef idx="1">
+              <a:schemeClr val="accent1"/>
+            </a:fillRef>
+            <a:effectRef idx="0">
+              <a:schemeClr val="accent1"/>
+            </a:effectRef>
+            <a:fontRef idx="minor">
+              <a:schemeClr val="lt1"/>
+            </a:fontRef>
+          </p:style>
+          <p:txBody>
+            <a:bodyPr rtlCol="0" anchor="ctr"/>
+            <a:lstStyle/>
+            <a:p>
+              <a:pPr algn="ctr"/>
+              <a:endParaRPr kumimoji="1" lang="zh-CN" altLang="en-US"/>
+            </a:p>
+          </p:txBody>
+        </p:sp>
+        <p:cxnSp>
+          <p:nvCxnSpPr>
+            <p:cNvPr id="9" name="曲线连接符 8">
+              <a:extLst>
+                <a:ext uri="{FF2B5EF4-FFF2-40B4-BE49-F238E27FC236}">
+                  <a16:creationId xmlns:a16="http://schemas.microsoft.com/office/drawing/2014/main" id="{92247B28-B367-4740-A76A-21A43315C3C7}"/>
+                </a:ext>
+              </a:extLst>
+            </p:cNvPr>
+            <p:cNvCxnSpPr>
+              <a:stCxn id="7" idx="4"/>
+            </p:cNvCxnSpPr>
+            <p:nvPr/>
+          </p:nvCxnSpPr>
+          <p:spPr>
+            <a:xfrm rot="5400000">
+              <a:off x="1926706" y="1651000"/>
+              <a:ext cx="220134" cy="79022"/>
+            </a:xfrm>
+            <a:prstGeom prst="curvedConnector3">
+              <a:avLst/>
+            </a:prstGeom>
+            <a:ln>
+              <a:tailEnd type="triangle"/>
+            </a:ln>
+          </p:spPr>
+          <p:style>
+            <a:lnRef idx="1">
+              <a:schemeClr val="dk1"/>
+            </a:lnRef>
+            <a:fillRef idx="0">
+              <a:schemeClr val="dk1"/>
+            </a:fillRef>
+            <a:effectRef idx="0">
+              <a:schemeClr val="dk1"/>
+            </a:effectRef>
+            <a:fontRef idx="minor">
+              <a:schemeClr val="tx1"/>
+            </a:fontRef>
+          </p:style>
+        </p:cxnSp>
+        <p:cxnSp>
+          <p:nvCxnSpPr>
+            <p:cNvPr id="11" name="曲线连接符 10">
+              <a:extLst>
+                <a:ext uri="{FF2B5EF4-FFF2-40B4-BE49-F238E27FC236}">
+                  <a16:creationId xmlns:a16="http://schemas.microsoft.com/office/drawing/2014/main" id="{CF81AF35-CF80-A945-B6CF-EDB491361071}"/>
+                </a:ext>
+              </a:extLst>
+            </p:cNvPr>
+            <p:cNvCxnSpPr>
+              <a:cxnSpLocks/>
+            </p:cNvCxnSpPr>
+            <p:nvPr/>
+          </p:nvCxnSpPr>
+          <p:spPr>
+            <a:xfrm rot="10800000">
+              <a:off x="1501422" y="1879600"/>
+              <a:ext cx="174978" cy="12700"/>
+            </a:xfrm>
+            <a:prstGeom prst="curvedConnector3">
+              <a:avLst/>
+            </a:prstGeom>
+            <a:ln>
+              <a:tailEnd type="triangle"/>
+            </a:ln>
+          </p:spPr>
+          <p:style>
+            <a:lnRef idx="1">
+              <a:schemeClr val="dk1"/>
+            </a:lnRef>
+            <a:fillRef idx="0">
+              <a:schemeClr val="dk1"/>
+            </a:fillRef>
+            <a:effectRef idx="0">
+              <a:schemeClr val="dk1"/>
+            </a:effectRef>
+            <a:fontRef idx="minor">
+              <a:schemeClr val="tx1"/>
+            </a:fontRef>
+          </p:style>
+        </p:cxnSp>
+        <p:cxnSp>
+          <p:nvCxnSpPr>
+            <p:cNvPr id="14" name="曲线连接符 13">
+              <a:extLst>
+                <a:ext uri="{FF2B5EF4-FFF2-40B4-BE49-F238E27FC236}">
+                  <a16:creationId xmlns:a16="http://schemas.microsoft.com/office/drawing/2014/main" id="{99308F9B-808C-CC46-88C1-E1F7D31248C5}"/>
+                </a:ext>
+              </a:extLst>
+            </p:cNvPr>
+            <p:cNvCxnSpPr>
+              <a:stCxn id="5" idx="7"/>
+            </p:cNvCxnSpPr>
+            <p:nvPr/>
+          </p:nvCxnSpPr>
+          <p:spPr>
+            <a:xfrm rot="5400000" flipH="1" flipV="1">
+              <a:off x="1569265" y="1226393"/>
+              <a:ext cx="128164" cy="152097"/>
+            </a:xfrm>
+            <a:prstGeom prst="curvedConnector2">
+              <a:avLst/>
+            </a:prstGeom>
+            <a:ln>
+              <a:tailEnd type="triangle"/>
+            </a:ln>
+          </p:spPr>
+          <p:style>
+            <a:lnRef idx="1">
+              <a:schemeClr val="dk1"/>
+            </a:lnRef>
+            <a:fillRef idx="0">
+              <a:schemeClr val="dk1"/>
+            </a:fillRef>
+            <a:effectRef idx="0">
+              <a:schemeClr val="dk1"/>
+            </a:effectRef>
+            <a:fontRef idx="minor">
+              <a:schemeClr val="tx1"/>
+            </a:fontRef>
+          </p:style>
+        </p:cxnSp>
+        <p:sp>
+          <p:nvSpPr>
+            <p:cNvPr id="24" name="椭圆 23">
+              <a:extLst>
+                <a:ext uri="{FF2B5EF4-FFF2-40B4-BE49-F238E27FC236}">
+                  <a16:creationId xmlns:a16="http://schemas.microsoft.com/office/drawing/2014/main" id="{2DD61F66-CF39-48E6-ABBF-9ADDEA68B4CB}"/>
+                </a:ext>
+              </a:extLst>
+            </p:cNvPr>
+            <p:cNvSpPr/>
+            <p:nvPr/>
+          </p:nvSpPr>
+          <p:spPr>
+            <a:xfrm>
+              <a:off x="1348044" y="1621160"/>
+              <a:ext cx="158044" cy="158044"/>
+            </a:xfrm>
+            <a:prstGeom prst="ellipse">
+              <a:avLst/>
+            </a:prstGeom>
+            <a:solidFill>
+              <a:srgbClr val="7030A0"/>
+            </a:solidFill>
+            <a:ln>
+              <a:noFill/>
+            </a:ln>
+          </p:spPr>
+          <p:style>
+            <a:lnRef idx="2">
+              <a:schemeClr val="accent1">
+                <a:shade val="50000"/>
+              </a:schemeClr>
+            </a:lnRef>
+            <a:fillRef idx="1">
+              <a:schemeClr val="accent1"/>
+            </a:fillRef>
+            <a:effectRef idx="0">
+              <a:schemeClr val="accent1"/>
+            </a:effectRef>
+            <a:fontRef idx="minor">
+              <a:schemeClr val="lt1"/>
+            </a:fontRef>
+          </p:style>
+          <p:txBody>
+            <a:bodyPr rtlCol="0" anchor="ctr"/>
+            <a:lstStyle/>
+            <a:p>
+              <a:pPr algn="ctr"/>
+              <a:endParaRPr kumimoji="1" lang="zh-CN" altLang="en-US"/>
+            </a:p>
+          </p:txBody>
+        </p:sp>
+        <p:cxnSp>
+          <p:nvCxnSpPr>
+            <p:cNvPr id="25" name="曲线连接符 10">
+              <a:extLst>
+                <a:ext uri="{FF2B5EF4-FFF2-40B4-BE49-F238E27FC236}">
+                  <a16:creationId xmlns:a16="http://schemas.microsoft.com/office/drawing/2014/main" id="{5FE1FAD0-607E-44B8-8061-E0D5043CF8AA}"/>
+                </a:ext>
+              </a:extLst>
+            </p:cNvPr>
+            <p:cNvCxnSpPr>
+              <a:cxnSpLocks/>
+              <a:stCxn id="24" idx="7"/>
+            </p:cNvCxnSpPr>
+            <p:nvPr/>
+          </p:nvCxnSpPr>
+          <p:spPr>
+            <a:xfrm rot="5400000" flipH="1" flipV="1">
+              <a:off x="1554159" y="1468705"/>
+              <a:ext cx="104385" cy="246816"/>
+            </a:xfrm>
+            <a:prstGeom prst="curvedConnector2">
+              <a:avLst/>
+            </a:prstGeom>
+            <a:ln>
+              <a:tailEnd type="triangle"/>
+            </a:ln>
+          </p:spPr>
+          <p:style>
+            <a:lnRef idx="1">
+              <a:schemeClr val="dk1"/>
+            </a:lnRef>
+            <a:fillRef idx="0">
+              <a:schemeClr val="dk1"/>
+            </a:fillRef>
+            <a:effectRef idx="0">
+              <a:schemeClr val="dk1"/>
+            </a:effectRef>
+            <a:fontRef idx="minor">
+              <a:schemeClr val="tx1"/>
+            </a:fontRef>
+          </p:style>
+        </p:cxnSp>
+      </p:grpSp>
+      <p:sp>
+        <p:nvSpPr>
+          <p:cNvPr id="16" name="文本框 15">
+            <a:extLst>
+              <a:ext uri="{FF2B5EF4-FFF2-40B4-BE49-F238E27FC236}">
+                <a16:creationId xmlns:a16="http://schemas.microsoft.com/office/drawing/2014/main" id="{A43E0EB2-F85B-884E-A4BB-AEBA23A34C80}"/>
+              </a:ext>
+            </a:extLst>
+          </p:cNvPr>
+          <p:cNvSpPr txBox="1"/>
+          <p:nvPr/>
+        </p:nvSpPr>
+        <p:spPr>
+          <a:xfrm>
+            <a:off x="4174604" y="805247"/>
+            <a:ext cx="6275542" cy="923330"/>
+          </a:xfrm>
+          <a:prstGeom prst="rect">
+            <a:avLst/>
+          </a:prstGeom>
+          <a:noFill/>
+        </p:spPr>
+        <p:txBody>
+          <a:bodyPr wrap="square" rtlCol="0">
+            <a:spAutoFit/>
+          </a:bodyPr>
+          <a:lstStyle/>
+          <a:p>
+            <a:r>
+              <a:rPr kumimoji="1" lang="zh-CN" altLang="en-US" dirty="0"/>
+              <a:t>每个试次您将观看一段运动，包含</a:t>
+            </a:r>
+            <a:r>
+              <a:rPr kumimoji="1" lang="en-US" altLang="zh-CN" dirty="0"/>
+              <a:t>4</a:t>
+            </a:r>
+            <a:r>
+              <a:rPr kumimoji="1" lang="zh-CN" altLang="en-US" dirty="0"/>
+              <a:t>个不同颜色的小球和</a:t>
+            </a:r>
+            <a:r>
+              <a:rPr kumimoji="1" lang="en-US" altLang="zh-CN" dirty="0"/>
+              <a:t>1</a:t>
+            </a:r>
+            <a:r>
+              <a:rPr kumimoji="1" lang="zh-CN" altLang="en-US" dirty="0"/>
+              <a:t>条连线。</a:t>
+            </a:r>
+            <a:r>
+              <a:rPr kumimoji="1" lang="en-US" altLang="zh-CN" dirty="0"/>
+              <a:t>4</a:t>
+            </a:r>
+            <a:r>
+              <a:rPr kumimoji="1" lang="zh-CN" altLang="en-US" dirty="0"/>
+              <a:t>个小球中可能存在追逐，即存在一只狼追一只羊的运动</a:t>
+            </a:r>
+            <a:r>
+              <a:rPr kumimoji="1" lang="en-US" altLang="zh-CN" dirty="0"/>
+              <a:t>(50%</a:t>
+            </a:r>
+            <a:r>
+              <a:rPr kumimoji="1" lang="zh-CN" altLang="en-US" dirty="0"/>
+              <a:t>试次</a:t>
+            </a:r>
+            <a:r>
+              <a:rPr kumimoji="1" lang="en-US" altLang="zh-CN" dirty="0"/>
+              <a:t>) </a:t>
+            </a:r>
+            <a:r>
+              <a:rPr kumimoji="1" lang="zh-CN" altLang="en-US" dirty="0"/>
+              <a:t>也可能不存在追逐</a:t>
+            </a:r>
+            <a:r>
+              <a:rPr kumimoji="1" lang="en-US" altLang="zh-CN" dirty="0"/>
+              <a:t>(50%</a:t>
+            </a:r>
+            <a:r>
+              <a:rPr kumimoji="1" lang="zh-CN" altLang="en-US" dirty="0"/>
+              <a:t>试次</a:t>
+            </a:r>
+            <a:r>
+              <a:rPr kumimoji="1" lang="en-US" altLang="zh-CN" dirty="0"/>
+              <a:t>)</a:t>
+            </a:r>
+            <a:r>
+              <a:rPr kumimoji="1" lang="zh-CN" altLang="en-US" dirty="0"/>
+              <a:t>。</a:t>
+            </a:r>
+            <a:endParaRPr kumimoji="1" lang="en-US" altLang="zh-CN" dirty="0"/>
+          </a:p>
+        </p:txBody>
+      </p:sp>
+      <p:sp>
+        <p:nvSpPr>
+          <p:cNvPr id="52" name="圆角矩形 51">
+            <a:extLst>
+              <a:ext uri="{FF2B5EF4-FFF2-40B4-BE49-F238E27FC236}">
+                <a16:creationId xmlns:a16="http://schemas.microsoft.com/office/drawing/2014/main" id="{80A52298-B332-3945-869A-BFCB177279F2}"/>
+              </a:ext>
+            </a:extLst>
+          </p:cNvPr>
+          <p:cNvSpPr/>
+          <p:nvPr/>
+        </p:nvSpPr>
+        <p:spPr>
+          <a:xfrm>
+            <a:off x="1679026" y="254000"/>
+            <a:ext cx="8900074" cy="6090356"/>
+          </a:xfrm>
+          <a:prstGeom prst="roundRect">
+            <a:avLst>
+              <a:gd name="adj" fmla="val 0"/>
+            </a:avLst>
+          </a:prstGeom>
+          <a:noFill/>
+          <a:ln>
+            <a:solidFill>
+              <a:schemeClr val="tx1"/>
+            </a:solidFill>
+          </a:ln>
+        </p:spPr>
+        <p:style>
+          <a:lnRef idx="2">
+            <a:schemeClr val="dk1"/>
+          </a:lnRef>
+          <a:fillRef idx="1">
+            <a:schemeClr val="lt1"/>
+          </a:fillRef>
+          <a:effectRef idx="0">
+            <a:schemeClr val="dk1"/>
+          </a:effectRef>
+          <a:fontRef idx="minor">
+            <a:schemeClr val="dk1"/>
+          </a:fontRef>
+        </p:style>
+        <p:txBody>
+          <a:bodyPr rtlCol="0" anchor="ctr"/>
+          <a:lstStyle/>
+          <a:p>
+            <a:pPr algn="ctr"/>
+            <a:endParaRPr kumimoji="1" lang="zh-CN" altLang="en-US"/>
+          </a:p>
+        </p:txBody>
+      </p:sp>
+      <p:sp>
+        <p:nvSpPr>
+          <p:cNvPr id="8" name="文本框 7">
+            <a:extLst>
+              <a:ext uri="{FF2B5EF4-FFF2-40B4-BE49-F238E27FC236}">
+                <a16:creationId xmlns:a16="http://schemas.microsoft.com/office/drawing/2014/main" id="{92B59CCD-E81A-BB46-975B-00C127C9F7FE}"/>
+              </a:ext>
+            </a:extLst>
+          </p:cNvPr>
+          <p:cNvSpPr txBox="1"/>
+          <p:nvPr/>
+        </p:nvSpPr>
+        <p:spPr>
+          <a:xfrm>
+            <a:off x="1787637" y="2846826"/>
+            <a:ext cx="5487142" cy="1200329"/>
+          </a:xfrm>
+          <a:prstGeom prst="rect">
+            <a:avLst/>
+          </a:prstGeom>
+          <a:noFill/>
+        </p:spPr>
+        <p:txBody>
+          <a:bodyPr wrap="square" rtlCol="0">
+            <a:spAutoFit/>
+          </a:bodyPr>
+          <a:lstStyle/>
+          <a:p>
+            <a:r>
+              <a:rPr kumimoji="1" lang="zh-CN" altLang="en-US" dirty="0"/>
+              <a:t>狼的追逐可能存在偏离角度。因此狼的运动不一定直接向着羊的当前位置。</a:t>
+            </a:r>
+            <a:r>
+              <a:rPr kumimoji="1" lang="zh-CN" altLang="en-US" b="1" dirty="0"/>
+              <a:t>但总体来说只要一个物体的运动并非随机，而是向着另一个物体靠近</a:t>
+            </a:r>
+            <a:r>
+              <a:rPr kumimoji="1" lang="zh-CN" altLang="en-US" dirty="0"/>
+              <a:t>，就可以算作是狼。</a:t>
+            </a:r>
+            <a:endParaRPr kumimoji="1" lang="en-US" altLang="zh-CN" dirty="0"/>
+          </a:p>
+        </p:txBody>
+      </p:sp>
+      <p:grpSp>
+        <p:nvGrpSpPr>
+          <p:cNvPr id="33" name="组合 32">
+            <a:extLst>
+              <a:ext uri="{FF2B5EF4-FFF2-40B4-BE49-F238E27FC236}">
+                <a16:creationId xmlns:a16="http://schemas.microsoft.com/office/drawing/2014/main" id="{7FC96169-34F4-1040-9485-0A9C6F4A8C76}"/>
+              </a:ext>
+            </a:extLst>
+          </p:cNvPr>
+          <p:cNvGrpSpPr/>
+          <p:nvPr/>
+        </p:nvGrpSpPr>
+        <p:grpSpPr>
+          <a:xfrm>
+            <a:off x="7684419" y="2491433"/>
+            <a:ext cx="2590684" cy="1899037"/>
+            <a:chOff x="6440556" y="2466229"/>
+            <a:chExt cx="2590684" cy="1899037"/>
+          </a:xfrm>
+        </p:grpSpPr>
+        <p:sp>
+          <p:nvSpPr>
+            <p:cNvPr id="36" name="椭圆 35">
+              <a:extLst>
+                <a:ext uri="{FF2B5EF4-FFF2-40B4-BE49-F238E27FC236}">
+                  <a16:creationId xmlns:a16="http://schemas.microsoft.com/office/drawing/2014/main" id="{24D7EFEA-E8CA-4045-BBD9-599E8177DC8F}"/>
+                </a:ext>
+              </a:extLst>
+            </p:cNvPr>
+            <p:cNvSpPr/>
+            <p:nvPr/>
+          </p:nvSpPr>
+          <p:spPr>
+            <a:xfrm>
+              <a:off x="6440556" y="3848431"/>
+              <a:ext cx="516835" cy="516835"/>
+            </a:xfrm>
+            <a:prstGeom prst="ellipse">
+              <a:avLst/>
+            </a:prstGeom>
+          </p:spPr>
+          <p:style>
+            <a:lnRef idx="2">
+              <a:schemeClr val="dk1"/>
+            </a:lnRef>
+            <a:fillRef idx="1">
+              <a:schemeClr val="lt1"/>
+            </a:fillRef>
+            <a:effectRef idx="0">
+              <a:schemeClr val="dk1"/>
+            </a:effectRef>
+            <a:fontRef idx="minor">
+              <a:schemeClr val="dk1"/>
+            </a:fontRef>
+          </p:style>
+          <p:txBody>
+            <a:bodyPr rtlCol="0" anchor="ctr"/>
+            <a:lstStyle/>
+            <a:p>
+              <a:pPr algn="ctr"/>
+              <a:r>
+                <a:rPr kumimoji="1" lang="zh-CN" altLang="en-US" b="1" dirty="0">
+                  <a:solidFill>
+                    <a:srgbClr val="FF0000"/>
+                  </a:solidFill>
+                </a:rPr>
+                <a:t>狼</a:t>
+              </a:r>
+            </a:p>
+          </p:txBody>
+        </p:sp>
+        <p:sp>
+          <p:nvSpPr>
+            <p:cNvPr id="37" name="椭圆 36">
+              <a:extLst>
+                <a:ext uri="{FF2B5EF4-FFF2-40B4-BE49-F238E27FC236}">
+                  <a16:creationId xmlns:a16="http://schemas.microsoft.com/office/drawing/2014/main" id="{EA5E2295-366D-9342-A24D-5651FFD86FC6}"/>
+                </a:ext>
+              </a:extLst>
+            </p:cNvPr>
+            <p:cNvSpPr/>
+            <p:nvPr/>
+          </p:nvSpPr>
+          <p:spPr>
+            <a:xfrm>
+              <a:off x="7054132" y="2466229"/>
+              <a:ext cx="516835" cy="516835"/>
+            </a:xfrm>
+            <a:prstGeom prst="ellipse">
+              <a:avLst/>
+            </a:prstGeom>
+          </p:spPr>
+          <p:style>
+            <a:lnRef idx="2">
+              <a:schemeClr val="dk1"/>
+            </a:lnRef>
+            <a:fillRef idx="1">
+              <a:schemeClr val="lt1"/>
+            </a:fillRef>
+            <a:effectRef idx="0">
+              <a:schemeClr val="dk1"/>
+            </a:effectRef>
+            <a:fontRef idx="minor">
+              <a:schemeClr val="dk1"/>
+            </a:fontRef>
+          </p:style>
+          <p:txBody>
+            <a:bodyPr rtlCol="0" anchor="ctr"/>
+            <a:lstStyle/>
+            <a:p>
+              <a:pPr algn="ctr"/>
+              <a:r>
+                <a:rPr kumimoji="1" lang="zh-CN" altLang="en-US" b="1" dirty="0">
+                  <a:solidFill>
+                    <a:srgbClr val="00B050"/>
+                  </a:solidFill>
+                </a:rPr>
+                <a:t>羊</a:t>
+              </a:r>
+            </a:p>
+          </p:txBody>
+        </p:sp>
+        <p:cxnSp>
+          <p:nvCxnSpPr>
+            <p:cNvPr id="41" name="直线箭头连接符 40">
+              <a:extLst>
+                <a:ext uri="{FF2B5EF4-FFF2-40B4-BE49-F238E27FC236}">
+                  <a16:creationId xmlns:a16="http://schemas.microsoft.com/office/drawing/2014/main" id="{C7BAD978-2985-1947-AA0E-16DF553BEA49}"/>
+                </a:ext>
+              </a:extLst>
+            </p:cNvPr>
+            <p:cNvCxnSpPr>
+              <a:cxnSpLocks/>
+            </p:cNvCxnSpPr>
+            <p:nvPr/>
+          </p:nvCxnSpPr>
+          <p:spPr>
+            <a:xfrm flipV="1">
+              <a:off x="6818091" y="2967162"/>
+              <a:ext cx="424146" cy="909251"/>
+            </a:xfrm>
+            <a:prstGeom prst="straightConnector1">
+              <a:avLst/>
+            </a:prstGeom>
+            <a:ln>
+              <a:tailEnd type="triangle"/>
+            </a:ln>
+          </p:spPr>
+          <p:style>
+            <a:lnRef idx="3">
+              <a:schemeClr val="dk1"/>
+            </a:lnRef>
+            <a:fillRef idx="0">
+              <a:schemeClr val="dk1"/>
+            </a:fillRef>
+            <a:effectRef idx="2">
+              <a:schemeClr val="dk1"/>
+            </a:effectRef>
+            <a:fontRef idx="minor">
+              <a:schemeClr val="tx1"/>
+            </a:fontRef>
+          </p:style>
+        </p:cxnSp>
+        <p:cxnSp>
+          <p:nvCxnSpPr>
+            <p:cNvPr id="42" name="直线箭头连接符 41">
+              <a:extLst>
+                <a:ext uri="{FF2B5EF4-FFF2-40B4-BE49-F238E27FC236}">
+                  <a16:creationId xmlns:a16="http://schemas.microsoft.com/office/drawing/2014/main" id="{EDB816CE-350F-AE42-90D6-ED08A837C61D}"/>
+                </a:ext>
+              </a:extLst>
+            </p:cNvPr>
+            <p:cNvCxnSpPr>
+              <a:cxnSpLocks/>
+            </p:cNvCxnSpPr>
+            <p:nvPr/>
+          </p:nvCxnSpPr>
+          <p:spPr>
+            <a:xfrm flipV="1">
+              <a:off x="6826042" y="3437689"/>
+              <a:ext cx="988917" cy="440636"/>
+            </a:xfrm>
+            <a:prstGeom prst="straightConnector1">
+              <a:avLst/>
+            </a:prstGeom>
+            <a:ln w="19050">
+              <a:prstDash val="sysDash"/>
+              <a:tailEnd type="triangle"/>
+            </a:ln>
+          </p:spPr>
+          <p:style>
+            <a:lnRef idx="3">
+              <a:schemeClr val="dk1"/>
+            </a:lnRef>
+            <a:fillRef idx="0">
+              <a:schemeClr val="dk1"/>
+            </a:fillRef>
+            <a:effectRef idx="2">
+              <a:schemeClr val="dk1"/>
+            </a:effectRef>
+            <a:fontRef idx="minor">
+              <a:schemeClr val="tx1"/>
+            </a:fontRef>
+          </p:style>
+        </p:cxnSp>
+        <p:sp>
+          <p:nvSpPr>
+            <p:cNvPr id="43" name="弧 42">
+              <a:extLst>
+                <a:ext uri="{FF2B5EF4-FFF2-40B4-BE49-F238E27FC236}">
+                  <a16:creationId xmlns:a16="http://schemas.microsoft.com/office/drawing/2014/main" id="{F4A58D22-2596-B643-853F-F61E49D4F9D1}"/>
+                </a:ext>
+              </a:extLst>
+            </p:cNvPr>
+            <p:cNvSpPr/>
+            <p:nvPr/>
+          </p:nvSpPr>
+          <p:spPr>
+            <a:xfrm>
+              <a:off x="6742707" y="3331598"/>
+              <a:ext cx="659958" cy="544816"/>
+            </a:xfrm>
+            <a:prstGeom prst="arc">
+              <a:avLst/>
+            </a:prstGeom>
+          </p:spPr>
+          <p:style>
+            <a:lnRef idx="3">
+              <a:schemeClr val="accent5"/>
+            </a:lnRef>
+            <a:fillRef idx="0">
+              <a:schemeClr val="accent5"/>
+            </a:fillRef>
+            <a:effectRef idx="2">
+              <a:schemeClr val="accent5"/>
+            </a:effectRef>
+            <a:fontRef idx="minor">
+              <a:schemeClr val="tx1"/>
+            </a:fontRef>
+          </p:style>
+          <p:txBody>
+            <a:bodyPr rtlCol="0" anchor="ctr"/>
+            <a:lstStyle/>
+            <a:p>
+              <a:pPr algn="ctr"/>
+              <a:endParaRPr kumimoji="1" lang="zh-CN" altLang="en-US"/>
+            </a:p>
+          </p:txBody>
+        </p:sp>
+        <p:sp>
+          <p:nvSpPr>
+            <p:cNvPr id="44" name="右箭头 43">
+              <a:extLst>
+                <a:ext uri="{FF2B5EF4-FFF2-40B4-BE49-F238E27FC236}">
+                  <a16:creationId xmlns:a16="http://schemas.microsoft.com/office/drawing/2014/main" id="{3A2F9FAE-D834-D840-8CCA-DDA41A5EF9CA}"/>
+                </a:ext>
+              </a:extLst>
+            </p:cNvPr>
+            <p:cNvSpPr/>
+            <p:nvPr/>
+          </p:nvSpPr>
+          <p:spPr>
+            <a:xfrm rot="20372945">
+              <a:off x="7317271" y="3171575"/>
+              <a:ext cx="711794" cy="109917"/>
+            </a:xfrm>
+            <a:prstGeom prst="rightArrow">
+              <a:avLst/>
+            </a:prstGeom>
+          </p:spPr>
+          <p:style>
+            <a:lnRef idx="1">
+              <a:schemeClr val="accent5"/>
+            </a:lnRef>
+            <a:fillRef idx="3">
+              <a:schemeClr val="accent5"/>
+            </a:fillRef>
+            <a:effectRef idx="2">
+              <a:schemeClr val="accent5"/>
+            </a:effectRef>
+            <a:fontRef idx="minor">
+              <a:schemeClr val="lt1"/>
+            </a:fontRef>
+          </p:style>
+          <p:txBody>
+            <a:bodyPr rtlCol="0" anchor="ctr"/>
+            <a:lstStyle/>
+            <a:p>
+              <a:pPr algn="ctr"/>
+              <a:endParaRPr kumimoji="1" lang="zh-CN" altLang="en-US"/>
+            </a:p>
+          </p:txBody>
+        </p:sp>
+        <p:sp>
+          <p:nvSpPr>
+            <p:cNvPr id="47" name="文本框 46">
+              <a:extLst>
+                <a:ext uri="{FF2B5EF4-FFF2-40B4-BE49-F238E27FC236}">
+                  <a16:creationId xmlns:a16="http://schemas.microsoft.com/office/drawing/2014/main" id="{B02986D2-BFD3-A542-AD43-18C549190042}"/>
+                </a:ext>
+              </a:extLst>
+            </p:cNvPr>
+            <p:cNvSpPr txBox="1"/>
+            <p:nvPr/>
+          </p:nvSpPr>
+          <p:spPr>
+            <a:xfrm>
+              <a:off x="8025837" y="2866037"/>
+              <a:ext cx="1005403" cy="338554"/>
+            </a:xfrm>
+            <a:prstGeom prst="rect">
+              <a:avLst/>
+            </a:prstGeom>
+          </p:spPr>
+          <p:style>
+            <a:lnRef idx="2">
+              <a:schemeClr val="dk1"/>
+            </a:lnRef>
+            <a:fillRef idx="1">
+              <a:schemeClr val="lt1"/>
+            </a:fillRef>
+            <a:effectRef idx="0">
+              <a:schemeClr val="dk1"/>
+            </a:effectRef>
+            <a:fontRef idx="minor">
+              <a:schemeClr val="dk1"/>
+            </a:fontRef>
+          </p:style>
+          <p:txBody>
+            <a:bodyPr wrap="none" rtlCol="0">
+              <a:spAutoFit/>
+            </a:bodyPr>
+            <a:lstStyle/>
+            <a:p>
+              <a:r>
+                <a:rPr kumimoji="1" lang="zh-CN" altLang="en-US" sz="1600" dirty="0"/>
+                <a:t>偏离角度</a:t>
+              </a:r>
+            </a:p>
+          </p:txBody>
+        </p:sp>
+      </p:grpSp>
+      <p:sp>
+        <p:nvSpPr>
+          <p:cNvPr id="50" name="圆角矩形 49">
+            <a:extLst>
+              <a:ext uri="{FF2B5EF4-FFF2-40B4-BE49-F238E27FC236}">
+                <a16:creationId xmlns:a16="http://schemas.microsoft.com/office/drawing/2014/main" id="{ED8C2CAD-7065-8745-B936-890F19A26D77}"/>
+              </a:ext>
+            </a:extLst>
+          </p:cNvPr>
+          <p:cNvSpPr/>
+          <p:nvPr/>
+        </p:nvSpPr>
+        <p:spPr>
+          <a:xfrm>
+            <a:off x="7425855" y="2362888"/>
+            <a:ext cx="2981739" cy="2154803"/>
+          </a:xfrm>
+          <a:prstGeom prst="roundRect">
+            <a:avLst/>
+          </a:prstGeom>
+          <a:noFill/>
+          <a:ln>
+            <a:solidFill>
+              <a:schemeClr val="tx1"/>
+            </a:solidFill>
+            <a:prstDash val="dash"/>
+          </a:ln>
+        </p:spPr>
+        <p:style>
+          <a:lnRef idx="2">
+            <a:schemeClr val="dk1"/>
+          </a:lnRef>
+          <a:fillRef idx="1">
+            <a:schemeClr val="lt1"/>
+          </a:fillRef>
+          <a:effectRef idx="0">
+            <a:schemeClr val="dk1"/>
+          </a:effectRef>
+          <a:fontRef idx="minor">
+            <a:schemeClr val="dk1"/>
+          </a:fontRef>
+        </p:style>
+        <p:txBody>
+          <a:bodyPr rtlCol="0" anchor="ctr"/>
+          <a:lstStyle/>
+          <a:p>
+            <a:pPr algn="ctr"/>
+            <a:endParaRPr kumimoji="1" lang="zh-CN" altLang="en-US"/>
+          </a:p>
+        </p:txBody>
+      </p:sp>
+      <p:sp>
+        <p:nvSpPr>
+          <p:cNvPr id="2" name="文本框 1">
+            <a:extLst>
+              <a:ext uri="{FF2B5EF4-FFF2-40B4-BE49-F238E27FC236}">
+                <a16:creationId xmlns:a16="http://schemas.microsoft.com/office/drawing/2014/main" id="{B88ACFA6-345B-C14B-9E38-E80A2CDD944E}"/>
+              </a:ext>
+            </a:extLst>
+          </p:cNvPr>
+          <p:cNvSpPr txBox="1"/>
+          <p:nvPr/>
+        </p:nvSpPr>
+        <p:spPr>
+          <a:xfrm>
+            <a:off x="4651736" y="5734756"/>
+            <a:ext cx="2954655" cy="369332"/>
+          </a:xfrm>
+          <a:prstGeom prst="rect">
+            <a:avLst/>
+          </a:prstGeom>
+          <a:noFill/>
+        </p:spPr>
+        <p:txBody>
+          <a:bodyPr wrap="none" rtlCol="0">
+            <a:spAutoFit/>
+          </a:bodyPr>
+          <a:lstStyle/>
+          <a:p>
+            <a:r>
+              <a:rPr kumimoji="1" lang="zh-CN" altLang="en-US" dirty="0"/>
+              <a:t>按空格键继续查看任务说明</a:t>
+            </a:r>
+          </a:p>
+        </p:txBody>
+      </p:sp>
+      <p:sp>
+        <p:nvSpPr>
+          <p:cNvPr id="13" name="任意多边形: 形状 12">
+            <a:extLst>
+              <a:ext uri="{FF2B5EF4-FFF2-40B4-BE49-F238E27FC236}">
+                <a16:creationId xmlns:a16="http://schemas.microsoft.com/office/drawing/2014/main" id="{869F05E7-084B-434B-A5CB-CCB044144780}"/>
+              </a:ext>
+            </a:extLst>
+          </p:cNvPr>
+          <p:cNvSpPr/>
+          <p:nvPr/>
+        </p:nvSpPr>
+        <p:spPr>
+          <a:xfrm>
+            <a:off x="3041482" y="1279501"/>
+            <a:ext cx="190500" cy="273844"/>
+          </a:xfrm>
+          <a:custGeom>
+            <a:avLst/>
+            <a:gdLst>
+              <a:gd name="connsiteX0" fmla="*/ 190500 w 190500"/>
+              <a:gd name="connsiteY0" fmla="*/ 0 h 273844"/>
+              <a:gd name="connsiteX1" fmla="*/ 69056 w 190500"/>
+              <a:gd name="connsiteY1" fmla="*/ 104775 h 273844"/>
+              <a:gd name="connsiteX2" fmla="*/ 0 w 190500"/>
+              <a:gd name="connsiteY2" fmla="*/ 273844 h 273844"/>
+            </a:gdLst>
+            <a:ahLst/>
+            <a:cxnLst>
+              <a:cxn ang="0">
+                <a:pos x="connsiteX0" y="connsiteY0"/>
+              </a:cxn>
+              <a:cxn ang="0">
+                <a:pos x="connsiteX1" y="connsiteY1"/>
+              </a:cxn>
+              <a:cxn ang="0">
+                <a:pos x="connsiteX2" y="connsiteY2"/>
+              </a:cxn>
+            </a:cxnLst>
+            <a:rect l="l" t="t" r="r" b="b"/>
+            <a:pathLst>
+              <a:path w="190500" h="273844">
+                <a:moveTo>
+                  <a:pt x="190500" y="0"/>
+                </a:moveTo>
+                <a:cubicBezTo>
+                  <a:pt x="145653" y="29567"/>
+                  <a:pt x="100806" y="59134"/>
+                  <a:pt x="69056" y="104775"/>
+                </a:cubicBezTo>
+                <a:cubicBezTo>
+                  <a:pt x="37306" y="150416"/>
+                  <a:pt x="18653" y="212130"/>
+                  <a:pt x="0" y="273844"/>
+                </a:cubicBezTo>
+              </a:path>
+            </a:pathLst>
+          </a:custGeom>
+          <a:noFill/>
+          <a:ln>
+            <a:solidFill>
+              <a:schemeClr val="bg1"/>
+            </a:solidFill>
+          </a:ln>
+        </p:spPr>
+        <p:style>
+          <a:lnRef idx="2">
+            <a:schemeClr val="accent1">
+              <a:shade val="50000"/>
+            </a:schemeClr>
+          </a:lnRef>
+          <a:fillRef idx="1">
+            <a:schemeClr val="accent1"/>
+          </a:fillRef>
+          <a:effectRef idx="0">
+            <a:schemeClr val="accent1"/>
+          </a:effectRef>
+          <a:fontRef idx="minor">
+            <a:schemeClr val="lt1"/>
+          </a:fontRef>
+        </p:style>
+        <p:txBody>
+          <a:bodyPr rtlCol="0" anchor="ctr"/>
+          <a:lstStyle/>
+          <a:p>
+            <a:pPr algn="ctr"/>
+            <a:endParaRPr lang="zh-CN" altLang="en-US"/>
+          </a:p>
+        </p:txBody>
+      </p:sp>
+    </p:spTree>
+    <p:extLst>
+      <p:ext uri="{BB962C8B-B14F-4D97-AF65-F5344CB8AC3E}">
+        <p14:creationId xmlns:p14="http://schemas.microsoft.com/office/powerpoint/2010/main" val="2695098506"/>
+      </p:ext>
+    </p:extLst>
+  </p:cSld>
+  <p:clrMapOvr>
+    <a:masterClrMapping/>
+  </p:clrMapOvr>
+</p:sld>
+</file>
+
+<file path=ppt/slides/slide4.xml><?xml version="1.0" encoding="utf-8"?>
+<p:sld xmlns:a="http://schemas.openxmlformats.org/drawingml/2006/main" xmlns:r="http://schemas.openxmlformats.org/officeDocument/2006/relationships" xmlns:p="http://schemas.openxmlformats.org/presentationml/2006/main">
+  <p:cSld>
+    <p:spTree>
+      <p:nvGrpSpPr>
+        <p:cNvPr id="1" name=""/>
+        <p:cNvGrpSpPr/>
+        <p:nvPr/>
+      </p:nvGrpSpPr>
+      <p:grpSpPr>
+        <a:xfrm>
+          <a:off x="0" y="0"/>
+          <a:ext cx="0" cy="0"/>
+          <a:chOff x="0" y="0"/>
+          <a:chExt cx="0" cy="0"/>
+        </a:xfrm>
+      </p:grpSpPr>
+      <p:sp>
+        <p:nvSpPr>
+          <p:cNvPr id="52" name="圆角矩形 51">
+            <a:extLst>
+              <a:ext uri="{FF2B5EF4-FFF2-40B4-BE49-F238E27FC236}">
+                <a16:creationId xmlns:a16="http://schemas.microsoft.com/office/drawing/2014/main" id="{80A52298-B332-3945-869A-BFCB177279F2}"/>
+              </a:ext>
+            </a:extLst>
+          </p:cNvPr>
+          <p:cNvSpPr/>
+          <p:nvPr/>
+        </p:nvSpPr>
+        <p:spPr>
+          <a:xfrm>
+            <a:off x="1679026" y="254000"/>
+            <a:ext cx="8900074" cy="6372578"/>
+          </a:xfrm>
+          <a:prstGeom prst="roundRect">
+            <a:avLst>
+              <a:gd name="adj" fmla="val 0"/>
+            </a:avLst>
+          </a:prstGeom>
+          <a:noFill/>
+          <a:ln>
+            <a:solidFill>
+              <a:schemeClr val="tx1"/>
+            </a:solidFill>
+          </a:ln>
+        </p:spPr>
+        <p:style>
+          <a:lnRef idx="2">
+            <a:schemeClr val="dk1"/>
+          </a:lnRef>
+          <a:fillRef idx="1">
+            <a:schemeClr val="lt1"/>
+          </a:fillRef>
+          <a:effectRef idx="0">
+            <a:schemeClr val="dk1"/>
+          </a:effectRef>
+          <a:fontRef idx="minor">
+            <a:schemeClr val="dk1"/>
+          </a:fontRef>
+        </p:style>
+        <p:txBody>
+          <a:bodyPr rtlCol="0" anchor="ctr"/>
+          <a:lstStyle/>
+          <a:p>
+            <a:pPr algn="ctr"/>
+            <a:endParaRPr kumimoji="1" lang="zh-CN" altLang="en-US"/>
+          </a:p>
+        </p:txBody>
+      </p:sp>
+      <p:sp>
+        <p:nvSpPr>
+          <p:cNvPr id="2" name="文本框 1">
+            <a:extLst>
+              <a:ext uri="{FF2B5EF4-FFF2-40B4-BE49-F238E27FC236}">
+                <a16:creationId xmlns:a16="http://schemas.microsoft.com/office/drawing/2014/main" id="{78960A14-C953-4C4A-91A2-09E8F3E14161}"/>
+              </a:ext>
+            </a:extLst>
+          </p:cNvPr>
+          <p:cNvSpPr txBox="1"/>
+          <p:nvPr/>
+        </p:nvSpPr>
+        <p:spPr>
+          <a:xfrm>
+            <a:off x="2161459" y="612716"/>
+            <a:ext cx="8017842" cy="1508105"/>
+          </a:xfrm>
+          <a:prstGeom prst="rect">
+            <a:avLst/>
+          </a:prstGeom>
+          <a:noFill/>
+        </p:spPr>
+        <p:txBody>
+          <a:bodyPr wrap="square" rtlCol="0">
+            <a:spAutoFit/>
+          </a:bodyPr>
+          <a:lstStyle/>
+          <a:p>
+            <a:r>
+              <a:rPr kumimoji="1" lang="zh-CN" altLang="en-US" sz="2000" b="1" dirty="0"/>
+              <a:t>任务：识别狼和羊的身份</a:t>
+            </a:r>
+            <a:r>
+              <a:rPr kumimoji="1" lang="zh-CN" altLang="en-US" dirty="0"/>
+              <a:t>。请在保持准确的前提下</a:t>
+            </a:r>
+            <a:r>
+              <a:rPr kumimoji="1" lang="zh-CN" altLang="en-US" sz="2000" b="1" dirty="0"/>
+              <a:t>尽快反应</a:t>
+            </a:r>
+            <a:r>
+              <a:rPr kumimoji="1" lang="zh-CN" altLang="en-US" dirty="0"/>
+              <a:t>，一旦确认是否存在追逐，立刻</a:t>
+            </a:r>
+            <a:r>
+              <a:rPr kumimoji="1" lang="zh-CN" altLang="en-US" b="1" dirty="0"/>
+              <a:t>按键判断</a:t>
+            </a:r>
+            <a:r>
+              <a:rPr kumimoji="1" lang="en-US" altLang="zh-CN" b="1" dirty="0"/>
+              <a:t>(J=</a:t>
+            </a:r>
+            <a:r>
+              <a:rPr kumimoji="1" lang="zh-CN" altLang="en-US" b="1" dirty="0"/>
+              <a:t>存在追逐</a:t>
+            </a:r>
+            <a:r>
+              <a:rPr kumimoji="1" lang="en-US" altLang="zh-CN" b="1" dirty="0"/>
+              <a:t>,</a:t>
+            </a:r>
+            <a:r>
+              <a:rPr kumimoji="1" lang="zh-CN" altLang="en-US" b="1" dirty="0"/>
+              <a:t> </a:t>
+            </a:r>
+            <a:r>
+              <a:rPr kumimoji="1" lang="en-US" altLang="zh-CN" b="1" dirty="0"/>
+              <a:t>F=</a:t>
+            </a:r>
+            <a:r>
+              <a:rPr kumimoji="1" lang="zh-CN" altLang="en-US" b="1" dirty="0"/>
+              <a:t>无追逐</a:t>
+            </a:r>
+            <a:r>
+              <a:rPr kumimoji="1" lang="en-US" altLang="zh-CN" b="1" dirty="0"/>
+              <a:t>)</a:t>
+            </a:r>
+            <a:r>
+              <a:rPr kumimoji="1" lang="zh-CN" altLang="en-US" dirty="0"/>
+              <a:t>。按键后运动停止，请根据屏幕提示用鼠标依次点击出“狼”和“羊”的身份，被点击为“狼”的小球会显示标记“</a:t>
+            </a:r>
+            <a:r>
+              <a:rPr kumimoji="1" lang="en-US" altLang="zh-CN" dirty="0"/>
+              <a:t>W</a:t>
+            </a:r>
+            <a:r>
+              <a:rPr kumimoji="1" lang="zh-CN" altLang="en-US" dirty="0"/>
+              <a:t>”，被点击为“羊”的小球会显示标记“</a:t>
+            </a:r>
+            <a:r>
+              <a:rPr kumimoji="1" lang="en-US" altLang="zh-CN" dirty="0"/>
+              <a:t>S</a:t>
+            </a:r>
+            <a:r>
+              <a:rPr kumimoji="1" lang="zh-CN" altLang="en-US" dirty="0"/>
+              <a:t>”。</a:t>
+            </a:r>
+            <a:endParaRPr kumimoji="1" lang="en-US" altLang="zh-CN" dirty="0"/>
+          </a:p>
+          <a:p>
+            <a:r>
+              <a:rPr kumimoji="1" lang="zh-CN" altLang="en-US" dirty="0"/>
+              <a:t>请再</a:t>
+            </a:r>
+            <a:r>
+              <a:rPr kumimoji="1" lang="en-US" altLang="zh-CN" dirty="0"/>
+              <a:t>10</a:t>
+            </a:r>
+            <a:r>
+              <a:rPr kumimoji="1" lang="zh-CN" altLang="en-US" dirty="0"/>
+              <a:t>秒内进行判断，若超出</a:t>
+            </a:r>
+            <a:r>
+              <a:rPr kumimoji="1" lang="en-US" altLang="zh-CN" dirty="0"/>
+              <a:t>10</a:t>
+            </a:r>
+            <a:r>
+              <a:rPr kumimoji="1" lang="zh-CN" altLang="en-US" dirty="0"/>
+              <a:t>秒，则运动结束并强迫要求进行作答。</a:t>
+            </a:r>
+            <a:endParaRPr kumimoji="1" lang="en-US" altLang="zh-CN" dirty="0"/>
+          </a:p>
+        </p:txBody>
+      </p:sp>
+      <p:grpSp>
+        <p:nvGrpSpPr>
+          <p:cNvPr id="32" name="组合 31">
+            <a:extLst>
+              <a:ext uri="{FF2B5EF4-FFF2-40B4-BE49-F238E27FC236}">
+                <a16:creationId xmlns:a16="http://schemas.microsoft.com/office/drawing/2014/main" id="{F1A274C9-E376-F840-B391-7CFA79F25E6F}"/>
+              </a:ext>
+            </a:extLst>
+          </p:cNvPr>
+          <p:cNvGrpSpPr/>
+          <p:nvPr/>
+        </p:nvGrpSpPr>
+        <p:grpSpPr>
+          <a:xfrm>
+            <a:off x="2161459" y="2980268"/>
+            <a:ext cx="3393182" cy="2730148"/>
+            <a:chOff x="812800" y="824088"/>
+            <a:chExt cx="1964266" cy="1580445"/>
+          </a:xfrm>
+        </p:grpSpPr>
+        <p:sp>
+          <p:nvSpPr>
+            <p:cNvPr id="34" name="矩形 33">
+              <a:extLst>
+                <a:ext uri="{FF2B5EF4-FFF2-40B4-BE49-F238E27FC236}">
+                  <a16:creationId xmlns:a16="http://schemas.microsoft.com/office/drawing/2014/main" id="{2B7E9057-EFC5-AD48-A698-8D63977E3245}"/>
+                </a:ext>
+              </a:extLst>
+            </p:cNvPr>
+            <p:cNvSpPr/>
+            <p:nvPr/>
+          </p:nvSpPr>
+          <p:spPr>
+            <a:xfrm>
+              <a:off x="812800" y="824088"/>
+              <a:ext cx="1964266" cy="1580445"/>
+            </a:xfrm>
+            <a:prstGeom prst="rect">
+              <a:avLst/>
+            </a:prstGeom>
+            <a:solidFill>
+              <a:srgbClr val="808080"/>
+            </a:solidFill>
+            <a:ln>
+              <a:noFill/>
+            </a:ln>
+          </p:spPr>
+          <p:style>
+            <a:lnRef idx="2">
+              <a:schemeClr val="accent1">
+                <a:shade val="50000"/>
+              </a:schemeClr>
+            </a:lnRef>
+            <a:fillRef idx="1">
+              <a:schemeClr val="accent1"/>
+            </a:fillRef>
+            <a:effectRef idx="0">
+              <a:schemeClr val="accent1"/>
+            </a:effectRef>
+            <a:fontRef idx="minor">
+              <a:schemeClr val="lt1"/>
+            </a:fontRef>
+          </p:style>
+          <p:txBody>
+            <a:bodyPr rtlCol="0" anchor="ctr"/>
+            <a:lstStyle/>
+            <a:p>
+              <a:pPr algn="ctr"/>
+              <a:endParaRPr kumimoji="1" lang="zh-CN" altLang="en-US"/>
+            </a:p>
+          </p:txBody>
+        </p:sp>
+        <p:sp>
+          <p:nvSpPr>
+            <p:cNvPr id="35" name="矩形 34">
+              <a:extLst>
+                <a:ext uri="{FF2B5EF4-FFF2-40B4-BE49-F238E27FC236}">
+                  <a16:creationId xmlns:a16="http://schemas.microsoft.com/office/drawing/2014/main" id="{2D4A9B84-835D-8B4C-8507-F3ACE52DD290}"/>
+                </a:ext>
+              </a:extLst>
+            </p:cNvPr>
+            <p:cNvSpPr/>
+            <p:nvPr/>
+          </p:nvSpPr>
+          <p:spPr>
+            <a:xfrm>
+              <a:off x="1230489" y="1106310"/>
+              <a:ext cx="1140178" cy="1004712"/>
+            </a:xfrm>
+            <a:prstGeom prst="rect">
+              <a:avLst/>
+            </a:prstGeom>
+            <a:noFill/>
+            <a:ln>
+              <a:solidFill>
+                <a:schemeClr val="tx1"/>
+              </a:solidFill>
+            </a:ln>
+          </p:spPr>
+          <p:style>
+            <a:lnRef idx="2">
+              <a:schemeClr val="accent1">
+                <a:shade val="50000"/>
+              </a:schemeClr>
+            </a:lnRef>
+            <a:fillRef idx="1">
+              <a:schemeClr val="accent1"/>
+            </a:fillRef>
+            <a:effectRef idx="0">
+              <a:schemeClr val="accent1"/>
+            </a:effectRef>
+            <a:fontRef idx="minor">
+              <a:schemeClr val="lt1"/>
+            </a:fontRef>
+          </p:style>
+          <p:txBody>
+            <a:bodyPr rtlCol="0" anchor="ctr"/>
+            <a:lstStyle/>
+            <a:p>
+              <a:pPr algn="ctr"/>
+              <a:endParaRPr kumimoji="1" lang="zh-CN" altLang="en-US"/>
+            </a:p>
+          </p:txBody>
+        </p:sp>
+        <p:sp>
+          <p:nvSpPr>
+            <p:cNvPr id="38" name="椭圆 37">
+              <a:extLst>
+                <a:ext uri="{FF2B5EF4-FFF2-40B4-BE49-F238E27FC236}">
+                  <a16:creationId xmlns:a16="http://schemas.microsoft.com/office/drawing/2014/main" id="{75645A4C-B357-624C-8FD3-52169CCE0A2B}"/>
+                </a:ext>
+              </a:extLst>
+            </p:cNvPr>
+            <p:cNvSpPr/>
+            <p:nvPr/>
+          </p:nvSpPr>
+          <p:spPr>
+            <a:xfrm>
+              <a:off x="1422400" y="1343378"/>
+              <a:ext cx="158044" cy="158044"/>
+            </a:xfrm>
+            <a:prstGeom prst="ellipse">
+              <a:avLst/>
+            </a:prstGeom>
+            <a:solidFill>
+              <a:srgbClr val="0070C0"/>
+            </a:solidFill>
+            <a:ln>
+              <a:noFill/>
+            </a:ln>
+          </p:spPr>
+          <p:style>
+            <a:lnRef idx="2">
+              <a:schemeClr val="accent1">
+                <a:shade val="50000"/>
+              </a:schemeClr>
+            </a:lnRef>
+            <a:fillRef idx="1">
+              <a:schemeClr val="accent1"/>
+            </a:fillRef>
+            <a:effectRef idx="0">
+              <a:schemeClr val="accent1"/>
+            </a:effectRef>
+            <a:fontRef idx="minor">
+              <a:schemeClr val="lt1"/>
+            </a:fontRef>
+          </p:style>
+          <p:txBody>
+            <a:bodyPr rtlCol="0" anchor="ctr"/>
+            <a:lstStyle/>
+            <a:p>
+              <a:pPr algn="ctr"/>
+              <a:r>
+                <a:rPr kumimoji="1" lang="en-US" altLang="zh-CN" dirty="0">
+                  <a:solidFill>
+                    <a:schemeClr val="tx1"/>
+                  </a:solidFill>
+                </a:rPr>
+                <a:t>w</a:t>
+              </a:r>
+              <a:endParaRPr kumimoji="1" lang="zh-CN" altLang="en-US" dirty="0">
+                <a:solidFill>
+                  <a:schemeClr val="tx1"/>
+                </a:solidFill>
+              </a:endParaRPr>
+            </a:p>
+          </p:txBody>
+        </p:sp>
+        <p:sp>
+          <p:nvSpPr>
+            <p:cNvPr id="39" name="椭圆 38">
+              <a:extLst>
+                <a:ext uri="{FF2B5EF4-FFF2-40B4-BE49-F238E27FC236}">
+                  <a16:creationId xmlns:a16="http://schemas.microsoft.com/office/drawing/2014/main" id="{81B872FB-82FC-9046-BB1B-6D8970544E1F}"/>
+                </a:ext>
+              </a:extLst>
+            </p:cNvPr>
+            <p:cNvSpPr/>
+            <p:nvPr/>
+          </p:nvSpPr>
+          <p:spPr>
+            <a:xfrm>
+              <a:off x="1676400" y="1800578"/>
+              <a:ext cx="158044" cy="158044"/>
+            </a:xfrm>
+            <a:prstGeom prst="ellipse">
+              <a:avLst/>
+            </a:prstGeom>
+            <a:solidFill>
+              <a:srgbClr val="FFC000"/>
+            </a:solidFill>
+            <a:ln>
+              <a:noFill/>
+            </a:ln>
+          </p:spPr>
+          <p:style>
+            <a:lnRef idx="2">
+              <a:schemeClr val="accent1">
+                <a:shade val="50000"/>
+              </a:schemeClr>
+            </a:lnRef>
+            <a:fillRef idx="1">
+              <a:schemeClr val="accent1"/>
+            </a:fillRef>
+            <a:effectRef idx="0">
+              <a:schemeClr val="accent1"/>
+            </a:effectRef>
+            <a:fontRef idx="minor">
+              <a:schemeClr val="lt1"/>
+            </a:fontRef>
+          </p:style>
+          <p:txBody>
+            <a:bodyPr rtlCol="0" anchor="ctr"/>
+            <a:lstStyle/>
+            <a:p>
+              <a:pPr algn="ctr"/>
+              <a:endParaRPr kumimoji="1" lang="zh-CN" altLang="en-US" dirty="0"/>
+            </a:p>
+          </p:txBody>
+        </p:sp>
+        <p:sp>
+          <p:nvSpPr>
+            <p:cNvPr id="40" name="椭圆 39">
+              <a:extLst>
+                <a:ext uri="{FF2B5EF4-FFF2-40B4-BE49-F238E27FC236}">
+                  <a16:creationId xmlns:a16="http://schemas.microsoft.com/office/drawing/2014/main" id="{37415AD4-82D5-F947-8E15-7FD8861AB304}"/>
+                </a:ext>
+              </a:extLst>
+            </p:cNvPr>
+            <p:cNvSpPr/>
+            <p:nvPr/>
+          </p:nvSpPr>
+          <p:spPr>
+            <a:xfrm>
+              <a:off x="1997262" y="1422400"/>
+              <a:ext cx="158044" cy="158044"/>
+            </a:xfrm>
+            <a:prstGeom prst="ellipse">
+              <a:avLst/>
+            </a:prstGeom>
+            <a:solidFill>
+              <a:srgbClr val="00B050"/>
+            </a:solidFill>
+            <a:ln>
+              <a:noFill/>
+            </a:ln>
+          </p:spPr>
+          <p:style>
+            <a:lnRef idx="2">
+              <a:schemeClr val="accent1">
+                <a:shade val="50000"/>
+              </a:schemeClr>
+            </a:lnRef>
+            <a:fillRef idx="1">
+              <a:schemeClr val="accent1"/>
+            </a:fillRef>
+            <a:effectRef idx="0">
+              <a:schemeClr val="accent1"/>
+            </a:effectRef>
+            <a:fontRef idx="minor">
+              <a:schemeClr val="lt1"/>
+            </a:fontRef>
+          </p:style>
+          <p:txBody>
+            <a:bodyPr rtlCol="0" anchor="ctr"/>
+            <a:lstStyle/>
+            <a:p>
+              <a:pPr algn="ctr"/>
+              <a:endParaRPr kumimoji="1" lang="zh-CN" altLang="en-US"/>
+            </a:p>
+          </p:txBody>
+        </p:sp>
+      </p:grpSp>
+      <p:sp>
+        <p:nvSpPr>
+          <p:cNvPr id="45" name="左箭头 46">
+            <a:extLst>
+              <a:ext uri="{FF2B5EF4-FFF2-40B4-BE49-F238E27FC236}">
+                <a16:creationId xmlns:a16="http://schemas.microsoft.com/office/drawing/2014/main" id="{E1F7259A-FD62-FD44-BDF7-1387FF77CA99}"/>
+              </a:ext>
+            </a:extLst>
+          </p:cNvPr>
+          <p:cNvSpPr/>
+          <p:nvPr/>
+        </p:nvSpPr>
+        <p:spPr>
+          <a:xfrm rot="3936468">
+            <a:off x="3355910" y="4124204"/>
+            <a:ext cx="166998" cy="104034"/>
+          </a:xfrm>
+          <a:custGeom>
+            <a:avLst/>
+            <a:gdLst>
+              <a:gd name="connsiteX0" fmla="*/ 0 w 1638300"/>
+              <a:gd name="connsiteY0" fmla="*/ 921775 h 1843549"/>
+              <a:gd name="connsiteX1" fmla="*/ 958848 w 1638300"/>
+              <a:gd name="connsiteY1" fmla="*/ 0 h 1843549"/>
+              <a:gd name="connsiteX2" fmla="*/ 958848 w 1638300"/>
+              <a:gd name="connsiteY2" fmla="*/ 714891 h 1843549"/>
+              <a:gd name="connsiteX3" fmla="*/ 1638300 w 1638300"/>
+              <a:gd name="connsiteY3" fmla="*/ 714891 h 1843549"/>
+              <a:gd name="connsiteX4" fmla="*/ 1638300 w 1638300"/>
+              <a:gd name="connsiteY4" fmla="*/ 1128658 h 1843549"/>
+              <a:gd name="connsiteX5" fmla="*/ 958848 w 1638300"/>
+              <a:gd name="connsiteY5" fmla="*/ 1128658 h 1843549"/>
+              <a:gd name="connsiteX6" fmla="*/ 958848 w 1638300"/>
+              <a:gd name="connsiteY6" fmla="*/ 1843549 h 1843549"/>
+              <a:gd name="connsiteX7" fmla="*/ 0 w 1638300"/>
+              <a:gd name="connsiteY7" fmla="*/ 921775 h 1843549"/>
+              <a:gd name="connsiteX0" fmla="*/ 0 w 1638300"/>
+              <a:gd name="connsiteY0" fmla="*/ 921775 h 1843549"/>
+              <a:gd name="connsiteX1" fmla="*/ 958848 w 1638300"/>
+              <a:gd name="connsiteY1" fmla="*/ 0 h 1843549"/>
+              <a:gd name="connsiteX2" fmla="*/ 590548 w 1638300"/>
+              <a:gd name="connsiteY2" fmla="*/ 765691 h 1843549"/>
+              <a:gd name="connsiteX3" fmla="*/ 1638300 w 1638300"/>
+              <a:gd name="connsiteY3" fmla="*/ 714891 h 1843549"/>
+              <a:gd name="connsiteX4" fmla="*/ 1638300 w 1638300"/>
+              <a:gd name="connsiteY4" fmla="*/ 1128658 h 1843549"/>
+              <a:gd name="connsiteX5" fmla="*/ 958848 w 1638300"/>
+              <a:gd name="connsiteY5" fmla="*/ 1128658 h 1843549"/>
+              <a:gd name="connsiteX6" fmla="*/ 958848 w 1638300"/>
+              <a:gd name="connsiteY6" fmla="*/ 1843549 h 1843549"/>
+              <a:gd name="connsiteX7" fmla="*/ 0 w 1638300"/>
+              <a:gd name="connsiteY7" fmla="*/ 921775 h 1843549"/>
+              <a:gd name="connsiteX0" fmla="*/ 0 w 1638300"/>
+              <a:gd name="connsiteY0" fmla="*/ 921775 h 1843549"/>
+              <a:gd name="connsiteX1" fmla="*/ 958848 w 1638300"/>
+              <a:gd name="connsiteY1" fmla="*/ 0 h 1843549"/>
+              <a:gd name="connsiteX2" fmla="*/ 590548 w 1638300"/>
+              <a:gd name="connsiteY2" fmla="*/ 765691 h 1843549"/>
+              <a:gd name="connsiteX3" fmla="*/ 1638300 w 1638300"/>
+              <a:gd name="connsiteY3" fmla="*/ 714891 h 1843549"/>
+              <a:gd name="connsiteX4" fmla="*/ 1638300 w 1638300"/>
+              <a:gd name="connsiteY4" fmla="*/ 1128658 h 1843549"/>
+              <a:gd name="connsiteX5" fmla="*/ 577848 w 1638300"/>
+              <a:gd name="connsiteY5" fmla="*/ 1052458 h 1843549"/>
+              <a:gd name="connsiteX6" fmla="*/ 958848 w 1638300"/>
+              <a:gd name="connsiteY6" fmla="*/ 1843549 h 1843549"/>
+              <a:gd name="connsiteX7" fmla="*/ 0 w 1638300"/>
+              <a:gd name="connsiteY7" fmla="*/ 921775 h 1843549"/>
+              <a:gd name="connsiteX0" fmla="*/ 0 w 2120900"/>
+              <a:gd name="connsiteY0" fmla="*/ 909075 h 1843549"/>
+              <a:gd name="connsiteX1" fmla="*/ 1441448 w 2120900"/>
+              <a:gd name="connsiteY1" fmla="*/ 0 h 1843549"/>
+              <a:gd name="connsiteX2" fmla="*/ 1073148 w 2120900"/>
+              <a:gd name="connsiteY2" fmla="*/ 765691 h 1843549"/>
+              <a:gd name="connsiteX3" fmla="*/ 2120900 w 2120900"/>
+              <a:gd name="connsiteY3" fmla="*/ 714891 h 1843549"/>
+              <a:gd name="connsiteX4" fmla="*/ 2120900 w 2120900"/>
+              <a:gd name="connsiteY4" fmla="*/ 1128658 h 1843549"/>
+              <a:gd name="connsiteX5" fmla="*/ 1060448 w 2120900"/>
+              <a:gd name="connsiteY5" fmla="*/ 1052458 h 1843549"/>
+              <a:gd name="connsiteX6" fmla="*/ 1441448 w 2120900"/>
+              <a:gd name="connsiteY6" fmla="*/ 1843549 h 1843549"/>
+              <a:gd name="connsiteX7" fmla="*/ 0 w 2120900"/>
+              <a:gd name="connsiteY7" fmla="*/ 909075 h 1843549"/>
+              <a:gd name="connsiteX0" fmla="*/ 0 w 2120900"/>
+              <a:gd name="connsiteY0" fmla="*/ 909075 h 1564149"/>
+              <a:gd name="connsiteX1" fmla="*/ 1441448 w 2120900"/>
+              <a:gd name="connsiteY1" fmla="*/ 0 h 1564149"/>
+              <a:gd name="connsiteX2" fmla="*/ 1073148 w 2120900"/>
+              <a:gd name="connsiteY2" fmla="*/ 765691 h 1564149"/>
+              <a:gd name="connsiteX3" fmla="*/ 2120900 w 2120900"/>
+              <a:gd name="connsiteY3" fmla="*/ 714891 h 1564149"/>
+              <a:gd name="connsiteX4" fmla="*/ 2120900 w 2120900"/>
+              <a:gd name="connsiteY4" fmla="*/ 1128658 h 1564149"/>
+              <a:gd name="connsiteX5" fmla="*/ 1060448 w 2120900"/>
+              <a:gd name="connsiteY5" fmla="*/ 1052458 h 1564149"/>
+              <a:gd name="connsiteX6" fmla="*/ 1327148 w 2120900"/>
+              <a:gd name="connsiteY6" fmla="*/ 1564149 h 1564149"/>
+              <a:gd name="connsiteX7" fmla="*/ 0 w 2120900"/>
+              <a:gd name="connsiteY7" fmla="*/ 909075 h 1564149"/>
+              <a:gd name="connsiteX0" fmla="*/ 0 w 2120900"/>
+              <a:gd name="connsiteY0" fmla="*/ 604275 h 1259349"/>
+              <a:gd name="connsiteX1" fmla="*/ 1390648 w 2120900"/>
+              <a:gd name="connsiteY1" fmla="*/ 0 h 1259349"/>
+              <a:gd name="connsiteX2" fmla="*/ 1073148 w 2120900"/>
+              <a:gd name="connsiteY2" fmla="*/ 460891 h 1259349"/>
+              <a:gd name="connsiteX3" fmla="*/ 2120900 w 2120900"/>
+              <a:gd name="connsiteY3" fmla="*/ 410091 h 1259349"/>
+              <a:gd name="connsiteX4" fmla="*/ 2120900 w 2120900"/>
+              <a:gd name="connsiteY4" fmla="*/ 823858 h 1259349"/>
+              <a:gd name="connsiteX5" fmla="*/ 1060448 w 2120900"/>
+              <a:gd name="connsiteY5" fmla="*/ 747658 h 1259349"/>
+              <a:gd name="connsiteX6" fmla="*/ 1327148 w 2120900"/>
+              <a:gd name="connsiteY6" fmla="*/ 1259349 h 1259349"/>
+              <a:gd name="connsiteX7" fmla="*/ 0 w 2120900"/>
+              <a:gd name="connsiteY7" fmla="*/ 604275 h 1259349"/>
+              <a:gd name="connsiteX0" fmla="*/ 0 w 2120900"/>
+              <a:gd name="connsiteY0" fmla="*/ 604275 h 1259349"/>
+              <a:gd name="connsiteX1" fmla="*/ 1390648 w 2120900"/>
+              <a:gd name="connsiteY1" fmla="*/ 0 h 1259349"/>
+              <a:gd name="connsiteX2" fmla="*/ 1073148 w 2120900"/>
+              <a:gd name="connsiteY2" fmla="*/ 460891 h 1259349"/>
+              <a:gd name="connsiteX3" fmla="*/ 1550908 w 2120900"/>
+              <a:gd name="connsiteY3" fmla="*/ 435491 h 1259349"/>
+              <a:gd name="connsiteX4" fmla="*/ 2120900 w 2120900"/>
+              <a:gd name="connsiteY4" fmla="*/ 823858 h 1259349"/>
+              <a:gd name="connsiteX5" fmla="*/ 1060448 w 2120900"/>
+              <a:gd name="connsiteY5" fmla="*/ 747658 h 1259349"/>
+              <a:gd name="connsiteX6" fmla="*/ 1327148 w 2120900"/>
+              <a:gd name="connsiteY6" fmla="*/ 1259349 h 1259349"/>
+              <a:gd name="connsiteX7" fmla="*/ 0 w 2120900"/>
+              <a:gd name="connsiteY7" fmla="*/ 604275 h 1259349"/>
+              <a:gd name="connsiteX0" fmla="*/ 0 w 1577419"/>
+              <a:gd name="connsiteY0" fmla="*/ 604275 h 1259349"/>
+              <a:gd name="connsiteX1" fmla="*/ 1390648 w 1577419"/>
+              <a:gd name="connsiteY1" fmla="*/ 0 h 1259349"/>
+              <a:gd name="connsiteX2" fmla="*/ 1073148 w 1577419"/>
+              <a:gd name="connsiteY2" fmla="*/ 460891 h 1259349"/>
+              <a:gd name="connsiteX3" fmla="*/ 1550908 w 1577419"/>
+              <a:gd name="connsiteY3" fmla="*/ 435491 h 1259349"/>
+              <a:gd name="connsiteX4" fmla="*/ 1577419 w 1577419"/>
+              <a:gd name="connsiteY4" fmla="*/ 773058 h 1259349"/>
+              <a:gd name="connsiteX5" fmla="*/ 1060448 w 1577419"/>
+              <a:gd name="connsiteY5" fmla="*/ 747658 h 1259349"/>
+              <a:gd name="connsiteX6" fmla="*/ 1327148 w 1577419"/>
+              <a:gd name="connsiteY6" fmla="*/ 1259349 h 1259349"/>
+              <a:gd name="connsiteX7" fmla="*/ 0 w 1577419"/>
+              <a:gd name="connsiteY7" fmla="*/ 604275 h 1259349"/>
+              <a:gd name="connsiteX0" fmla="*/ 0 w 1577419"/>
+              <a:gd name="connsiteY0" fmla="*/ 604275 h 1081549"/>
+              <a:gd name="connsiteX1" fmla="*/ 1390648 w 1577419"/>
+              <a:gd name="connsiteY1" fmla="*/ 0 h 1081549"/>
+              <a:gd name="connsiteX2" fmla="*/ 1073148 w 1577419"/>
+              <a:gd name="connsiteY2" fmla="*/ 460891 h 1081549"/>
+              <a:gd name="connsiteX3" fmla="*/ 1550908 w 1577419"/>
+              <a:gd name="connsiteY3" fmla="*/ 435491 h 1081549"/>
+              <a:gd name="connsiteX4" fmla="*/ 1577419 w 1577419"/>
+              <a:gd name="connsiteY4" fmla="*/ 773058 h 1081549"/>
+              <a:gd name="connsiteX5" fmla="*/ 1060448 w 1577419"/>
+              <a:gd name="connsiteY5" fmla="*/ 747658 h 1081549"/>
+              <a:gd name="connsiteX6" fmla="*/ 1207847 w 1577419"/>
+              <a:gd name="connsiteY6" fmla="*/ 1081549 h 1081549"/>
+              <a:gd name="connsiteX7" fmla="*/ 0 w 1577419"/>
+              <a:gd name="connsiteY7" fmla="*/ 604275 h 1081549"/>
+              <a:gd name="connsiteX0" fmla="*/ 0 w 1577419"/>
+              <a:gd name="connsiteY0" fmla="*/ 439175 h 916449"/>
+              <a:gd name="connsiteX1" fmla="*/ 1244836 w 1577419"/>
+              <a:gd name="connsiteY1" fmla="*/ 0 h 916449"/>
+              <a:gd name="connsiteX2" fmla="*/ 1073148 w 1577419"/>
+              <a:gd name="connsiteY2" fmla="*/ 295791 h 916449"/>
+              <a:gd name="connsiteX3" fmla="*/ 1550908 w 1577419"/>
+              <a:gd name="connsiteY3" fmla="*/ 270391 h 916449"/>
+              <a:gd name="connsiteX4" fmla="*/ 1577419 w 1577419"/>
+              <a:gd name="connsiteY4" fmla="*/ 607958 h 916449"/>
+              <a:gd name="connsiteX5" fmla="*/ 1060448 w 1577419"/>
+              <a:gd name="connsiteY5" fmla="*/ 582558 h 916449"/>
+              <a:gd name="connsiteX6" fmla="*/ 1207847 w 1577419"/>
+              <a:gd name="connsiteY6" fmla="*/ 916449 h 916449"/>
+              <a:gd name="connsiteX7" fmla="*/ 0 w 1577419"/>
+              <a:gd name="connsiteY7" fmla="*/ 439175 h 916449"/>
+            </a:gdLst>
+            <a:ahLst/>
+            <a:cxnLst>
+              <a:cxn ang="0">
+                <a:pos x="connsiteX0" y="connsiteY0"/>
+              </a:cxn>
+              <a:cxn ang="0">
+                <a:pos x="connsiteX1" y="connsiteY1"/>
+              </a:cxn>
+              <a:cxn ang="0">
+                <a:pos x="connsiteX2" y="connsiteY2"/>
+              </a:cxn>
+              <a:cxn ang="0">
+                <a:pos x="connsiteX3" y="connsiteY3"/>
+              </a:cxn>
+              <a:cxn ang="0">
+                <a:pos x="connsiteX4" y="connsiteY4"/>
+              </a:cxn>
+              <a:cxn ang="0">
+                <a:pos x="connsiteX5" y="connsiteY5"/>
+              </a:cxn>
+              <a:cxn ang="0">
+                <a:pos x="connsiteX6" y="connsiteY6"/>
+              </a:cxn>
+              <a:cxn ang="0">
+                <a:pos x="connsiteX7" y="connsiteY7"/>
+              </a:cxn>
+            </a:cxnLst>
+            <a:rect l="l" t="t" r="r" b="b"/>
+            <a:pathLst>
+              <a:path w="1577419" h="916449">
+                <a:moveTo>
+                  <a:pt x="0" y="439175"/>
+                </a:moveTo>
+                <a:lnTo>
+                  <a:pt x="1244836" y="0"/>
+                </a:lnTo>
+                <a:lnTo>
+                  <a:pt x="1073148" y="295791"/>
+                </a:lnTo>
+                <a:lnTo>
+                  <a:pt x="1550908" y="270391"/>
+                </a:lnTo>
+                <a:lnTo>
+                  <a:pt x="1577419" y="607958"/>
+                </a:lnTo>
+                <a:lnTo>
+                  <a:pt x="1060448" y="582558"/>
+                </a:lnTo>
+                <a:lnTo>
+                  <a:pt x="1207847" y="916449"/>
+                </a:lnTo>
+                <a:lnTo>
+                  <a:pt x="0" y="439175"/>
+                </a:lnTo>
+                <a:close/>
+              </a:path>
+            </a:pathLst>
+          </a:custGeom>
+          <a:solidFill>
+            <a:schemeClr val="bg1"/>
+          </a:solidFill>
+          <a:ln>
+            <a:solidFill>
+              <a:schemeClr val="tx1"/>
+            </a:solidFill>
+          </a:ln>
+        </p:spPr>
+        <p:style>
+          <a:lnRef idx="2">
+            <a:schemeClr val="accent1">
+              <a:shade val="50000"/>
+            </a:schemeClr>
+          </a:lnRef>
+          <a:fillRef idx="1">
+            <a:schemeClr val="accent1"/>
+          </a:fillRef>
+          <a:effectRef idx="0">
+            <a:schemeClr val="accent1"/>
+          </a:effectRef>
+          <a:fontRef idx="minor">
+            <a:schemeClr val="lt1"/>
+          </a:fontRef>
+        </p:style>
+        <p:txBody>
+          <a:bodyPr rtlCol="0" anchor="ctr"/>
+          <a:lstStyle/>
+          <a:p>
+            <a:pPr algn="ctr"/>
+            <a:endParaRPr lang="zh-CN" altLang="en-US" sz="2000">
+              <a:latin typeface="楷体" panose="02010609060101010101" pitchFamily="49" charset="-122"/>
+              <a:ea typeface="楷体" panose="02010609060101010101" pitchFamily="49" charset="-122"/>
+            </a:endParaRPr>
+          </a:p>
+        </p:txBody>
+      </p:sp>
+      <p:grpSp>
+        <p:nvGrpSpPr>
+          <p:cNvPr id="46" name="组合 45">
+            <a:extLst>
+              <a:ext uri="{FF2B5EF4-FFF2-40B4-BE49-F238E27FC236}">
+                <a16:creationId xmlns:a16="http://schemas.microsoft.com/office/drawing/2014/main" id="{712EF471-F8BE-A944-B9A5-BA0A02B10CA6}"/>
+              </a:ext>
+            </a:extLst>
+          </p:cNvPr>
+          <p:cNvGrpSpPr/>
+          <p:nvPr/>
+        </p:nvGrpSpPr>
+        <p:grpSpPr>
+          <a:xfrm>
+            <a:off x="6679971" y="2970517"/>
+            <a:ext cx="3393182" cy="2730148"/>
+            <a:chOff x="812800" y="824088"/>
+            <a:chExt cx="1964266" cy="1580445"/>
+          </a:xfrm>
+        </p:grpSpPr>
+        <p:sp>
+          <p:nvSpPr>
+            <p:cNvPr id="48" name="矩形 47">
+              <a:extLst>
+                <a:ext uri="{FF2B5EF4-FFF2-40B4-BE49-F238E27FC236}">
+                  <a16:creationId xmlns:a16="http://schemas.microsoft.com/office/drawing/2014/main" id="{E1CE42BF-84E8-004E-BBA1-51AF2CDE6C8A}"/>
+                </a:ext>
+              </a:extLst>
+            </p:cNvPr>
+            <p:cNvSpPr/>
+            <p:nvPr/>
+          </p:nvSpPr>
+          <p:spPr>
+            <a:xfrm>
+              <a:off x="812800" y="824088"/>
+              <a:ext cx="1964266" cy="1580445"/>
+            </a:xfrm>
+            <a:prstGeom prst="rect">
+              <a:avLst/>
+            </a:prstGeom>
+            <a:solidFill>
+              <a:srgbClr val="808080"/>
+            </a:solidFill>
+            <a:ln>
+              <a:noFill/>
+            </a:ln>
+          </p:spPr>
+          <p:style>
+            <a:lnRef idx="2">
+              <a:schemeClr val="accent1">
+                <a:shade val="50000"/>
+              </a:schemeClr>
+            </a:lnRef>
+            <a:fillRef idx="1">
+              <a:schemeClr val="accent1"/>
+            </a:fillRef>
+            <a:effectRef idx="0">
+              <a:schemeClr val="accent1"/>
+            </a:effectRef>
+            <a:fontRef idx="minor">
+              <a:schemeClr val="lt1"/>
+            </a:fontRef>
+          </p:style>
+          <p:txBody>
+            <a:bodyPr rtlCol="0" anchor="ctr"/>
+            <a:lstStyle/>
+            <a:p>
+              <a:pPr algn="ctr"/>
+              <a:endParaRPr kumimoji="1" lang="zh-CN" altLang="en-US"/>
+            </a:p>
+          </p:txBody>
+        </p:sp>
+        <p:sp>
+          <p:nvSpPr>
+            <p:cNvPr id="49" name="矩形 48">
+              <a:extLst>
+                <a:ext uri="{FF2B5EF4-FFF2-40B4-BE49-F238E27FC236}">
+                  <a16:creationId xmlns:a16="http://schemas.microsoft.com/office/drawing/2014/main" id="{9CB80EA2-3722-ED48-AA1A-FDF95AFBB71B}"/>
+                </a:ext>
+              </a:extLst>
+            </p:cNvPr>
+            <p:cNvSpPr/>
+            <p:nvPr/>
+          </p:nvSpPr>
+          <p:spPr>
+            <a:xfrm>
+              <a:off x="1230489" y="1106310"/>
+              <a:ext cx="1140178" cy="1004712"/>
+            </a:xfrm>
+            <a:prstGeom prst="rect">
+              <a:avLst/>
+            </a:prstGeom>
+            <a:noFill/>
+            <a:ln>
+              <a:solidFill>
+                <a:schemeClr val="tx1"/>
+              </a:solidFill>
+            </a:ln>
+          </p:spPr>
+          <p:style>
+            <a:lnRef idx="2">
+              <a:schemeClr val="accent1">
+                <a:shade val="50000"/>
+              </a:schemeClr>
+            </a:lnRef>
+            <a:fillRef idx="1">
+              <a:schemeClr val="accent1"/>
+            </a:fillRef>
+            <a:effectRef idx="0">
+              <a:schemeClr val="accent1"/>
+            </a:effectRef>
+            <a:fontRef idx="minor">
+              <a:schemeClr val="lt1"/>
+            </a:fontRef>
+          </p:style>
+          <p:txBody>
+            <a:bodyPr rtlCol="0" anchor="ctr"/>
+            <a:lstStyle/>
+            <a:p>
+              <a:pPr algn="ctr"/>
+              <a:endParaRPr kumimoji="1" lang="zh-CN" altLang="en-US"/>
+            </a:p>
+          </p:txBody>
+        </p:sp>
+        <p:sp>
+          <p:nvSpPr>
+            <p:cNvPr id="53" name="椭圆 52">
+              <a:extLst>
+                <a:ext uri="{FF2B5EF4-FFF2-40B4-BE49-F238E27FC236}">
+                  <a16:creationId xmlns:a16="http://schemas.microsoft.com/office/drawing/2014/main" id="{159460A9-0E2A-5544-BD0E-8169339FA745}"/>
+                </a:ext>
+              </a:extLst>
+            </p:cNvPr>
+            <p:cNvSpPr/>
+            <p:nvPr/>
+          </p:nvSpPr>
+          <p:spPr>
+            <a:xfrm>
+              <a:off x="1422400" y="1343378"/>
+              <a:ext cx="158044" cy="158044"/>
+            </a:xfrm>
+            <a:prstGeom prst="ellipse">
+              <a:avLst/>
+            </a:prstGeom>
+            <a:solidFill>
+              <a:srgbClr val="0070C0"/>
+            </a:solidFill>
+            <a:ln>
+              <a:noFill/>
+            </a:ln>
+          </p:spPr>
+          <p:style>
+            <a:lnRef idx="2">
+              <a:schemeClr val="accent1">
+                <a:shade val="50000"/>
+              </a:schemeClr>
+            </a:lnRef>
+            <a:fillRef idx="1">
+              <a:schemeClr val="accent1"/>
+            </a:fillRef>
+            <a:effectRef idx="0">
+              <a:schemeClr val="accent1"/>
+            </a:effectRef>
+            <a:fontRef idx="minor">
+              <a:schemeClr val="lt1"/>
+            </a:fontRef>
+          </p:style>
+          <p:txBody>
+            <a:bodyPr rtlCol="0" anchor="ctr"/>
+            <a:lstStyle/>
+            <a:p>
+              <a:pPr algn="ctr"/>
+              <a:r>
+                <a:rPr kumimoji="1" lang="en-US" altLang="zh-CN" dirty="0">
+                  <a:solidFill>
+                    <a:schemeClr val="tx1"/>
+                  </a:solidFill>
+                </a:rPr>
+                <a:t>w</a:t>
+              </a:r>
+              <a:endParaRPr kumimoji="1" lang="zh-CN" altLang="en-US" dirty="0">
+                <a:solidFill>
+                  <a:schemeClr val="tx1"/>
+                </a:solidFill>
+              </a:endParaRPr>
+            </a:p>
+          </p:txBody>
+        </p:sp>
+        <p:sp>
+          <p:nvSpPr>
+            <p:cNvPr id="54" name="椭圆 53">
+              <a:extLst>
+                <a:ext uri="{FF2B5EF4-FFF2-40B4-BE49-F238E27FC236}">
+                  <a16:creationId xmlns:a16="http://schemas.microsoft.com/office/drawing/2014/main" id="{A1FF86C3-AD58-D641-B354-FD7E8AF7F452}"/>
+                </a:ext>
+              </a:extLst>
+            </p:cNvPr>
+            <p:cNvSpPr/>
+            <p:nvPr/>
+          </p:nvSpPr>
+          <p:spPr>
+            <a:xfrm>
+              <a:off x="1676400" y="1800578"/>
+              <a:ext cx="158044" cy="158044"/>
+            </a:xfrm>
+            <a:prstGeom prst="ellipse">
+              <a:avLst/>
+            </a:prstGeom>
+            <a:solidFill>
+              <a:srgbClr val="FFC000"/>
+            </a:solidFill>
+            <a:ln>
+              <a:noFill/>
+            </a:ln>
+          </p:spPr>
+          <p:style>
+            <a:lnRef idx="2">
+              <a:schemeClr val="accent1">
+                <a:shade val="50000"/>
+              </a:schemeClr>
+            </a:lnRef>
+            <a:fillRef idx="1">
+              <a:schemeClr val="accent1"/>
+            </a:fillRef>
+            <a:effectRef idx="0">
+              <a:schemeClr val="accent1"/>
+            </a:effectRef>
+            <a:fontRef idx="minor">
+              <a:schemeClr val="lt1"/>
+            </a:fontRef>
+          </p:style>
+          <p:txBody>
+            <a:bodyPr rtlCol="0" anchor="ctr"/>
+            <a:lstStyle/>
+            <a:p>
+              <a:pPr algn="ctr"/>
+              <a:endParaRPr kumimoji="1" lang="zh-CN" altLang="en-US"/>
+            </a:p>
+          </p:txBody>
+        </p:sp>
+        <p:sp>
+          <p:nvSpPr>
+            <p:cNvPr id="55" name="椭圆 54">
+              <a:extLst>
+                <a:ext uri="{FF2B5EF4-FFF2-40B4-BE49-F238E27FC236}">
+                  <a16:creationId xmlns:a16="http://schemas.microsoft.com/office/drawing/2014/main" id="{C2066DA6-75D1-0B40-9BEC-FE9BFFD1BF43}"/>
+                </a:ext>
+              </a:extLst>
+            </p:cNvPr>
+            <p:cNvSpPr/>
+            <p:nvPr/>
+          </p:nvSpPr>
+          <p:spPr>
+            <a:xfrm>
+              <a:off x="1997262" y="1422400"/>
+              <a:ext cx="158044" cy="158044"/>
+            </a:xfrm>
+            <a:prstGeom prst="ellipse">
+              <a:avLst/>
+            </a:prstGeom>
+            <a:solidFill>
+              <a:srgbClr val="00B050"/>
+            </a:solidFill>
+            <a:ln>
+              <a:noFill/>
+            </a:ln>
+          </p:spPr>
+          <p:style>
+            <a:lnRef idx="2">
+              <a:schemeClr val="accent1">
+                <a:shade val="50000"/>
+              </a:schemeClr>
+            </a:lnRef>
+            <a:fillRef idx="1">
+              <a:schemeClr val="accent1"/>
+            </a:fillRef>
+            <a:effectRef idx="0">
+              <a:schemeClr val="accent1"/>
+            </a:effectRef>
+            <a:fontRef idx="minor">
+              <a:schemeClr val="lt1"/>
+            </a:fontRef>
+          </p:style>
+          <p:txBody>
+            <a:bodyPr rtlCol="0" anchor="ctr"/>
+            <a:lstStyle/>
+            <a:p>
+              <a:pPr algn="ctr"/>
+              <a:r>
+                <a:rPr kumimoji="1" lang="en-US" altLang="zh-CN" dirty="0">
+                  <a:solidFill>
+                    <a:schemeClr val="tx1"/>
+                  </a:solidFill>
+                </a:rPr>
+                <a:t>s</a:t>
+              </a:r>
+              <a:endParaRPr kumimoji="1" lang="zh-CN" altLang="en-US" dirty="0">
+                <a:solidFill>
+                  <a:schemeClr val="tx1"/>
+                </a:solidFill>
+              </a:endParaRPr>
+            </a:p>
+          </p:txBody>
+        </p:sp>
+      </p:grpSp>
+      <p:sp>
+        <p:nvSpPr>
+          <p:cNvPr id="56" name="左箭头 46">
+            <a:extLst>
+              <a:ext uri="{FF2B5EF4-FFF2-40B4-BE49-F238E27FC236}">
+                <a16:creationId xmlns:a16="http://schemas.microsoft.com/office/drawing/2014/main" id="{81BB6ABC-033D-1A4C-93A1-3EEECD62DD7F}"/>
+              </a:ext>
+            </a:extLst>
+          </p:cNvPr>
+          <p:cNvSpPr/>
+          <p:nvPr/>
+        </p:nvSpPr>
+        <p:spPr>
+          <a:xfrm rot="3936468">
+            <a:off x="8871267" y="4231922"/>
+            <a:ext cx="166998" cy="104034"/>
+          </a:xfrm>
+          <a:custGeom>
+            <a:avLst/>
+            <a:gdLst>
+              <a:gd name="connsiteX0" fmla="*/ 0 w 1638300"/>
+              <a:gd name="connsiteY0" fmla="*/ 921775 h 1843549"/>
+              <a:gd name="connsiteX1" fmla="*/ 958848 w 1638300"/>
+              <a:gd name="connsiteY1" fmla="*/ 0 h 1843549"/>
+              <a:gd name="connsiteX2" fmla="*/ 958848 w 1638300"/>
+              <a:gd name="connsiteY2" fmla="*/ 714891 h 1843549"/>
+              <a:gd name="connsiteX3" fmla="*/ 1638300 w 1638300"/>
+              <a:gd name="connsiteY3" fmla="*/ 714891 h 1843549"/>
+              <a:gd name="connsiteX4" fmla="*/ 1638300 w 1638300"/>
+              <a:gd name="connsiteY4" fmla="*/ 1128658 h 1843549"/>
+              <a:gd name="connsiteX5" fmla="*/ 958848 w 1638300"/>
+              <a:gd name="connsiteY5" fmla="*/ 1128658 h 1843549"/>
+              <a:gd name="connsiteX6" fmla="*/ 958848 w 1638300"/>
+              <a:gd name="connsiteY6" fmla="*/ 1843549 h 1843549"/>
+              <a:gd name="connsiteX7" fmla="*/ 0 w 1638300"/>
+              <a:gd name="connsiteY7" fmla="*/ 921775 h 1843549"/>
+              <a:gd name="connsiteX0" fmla="*/ 0 w 1638300"/>
+              <a:gd name="connsiteY0" fmla="*/ 921775 h 1843549"/>
+              <a:gd name="connsiteX1" fmla="*/ 958848 w 1638300"/>
+              <a:gd name="connsiteY1" fmla="*/ 0 h 1843549"/>
+              <a:gd name="connsiteX2" fmla="*/ 590548 w 1638300"/>
+              <a:gd name="connsiteY2" fmla="*/ 765691 h 1843549"/>
+              <a:gd name="connsiteX3" fmla="*/ 1638300 w 1638300"/>
+              <a:gd name="connsiteY3" fmla="*/ 714891 h 1843549"/>
+              <a:gd name="connsiteX4" fmla="*/ 1638300 w 1638300"/>
+              <a:gd name="connsiteY4" fmla="*/ 1128658 h 1843549"/>
+              <a:gd name="connsiteX5" fmla="*/ 958848 w 1638300"/>
+              <a:gd name="connsiteY5" fmla="*/ 1128658 h 1843549"/>
+              <a:gd name="connsiteX6" fmla="*/ 958848 w 1638300"/>
+              <a:gd name="connsiteY6" fmla="*/ 1843549 h 1843549"/>
+              <a:gd name="connsiteX7" fmla="*/ 0 w 1638300"/>
+              <a:gd name="connsiteY7" fmla="*/ 921775 h 1843549"/>
+              <a:gd name="connsiteX0" fmla="*/ 0 w 1638300"/>
+              <a:gd name="connsiteY0" fmla="*/ 921775 h 1843549"/>
+              <a:gd name="connsiteX1" fmla="*/ 958848 w 1638300"/>
+              <a:gd name="connsiteY1" fmla="*/ 0 h 1843549"/>
+              <a:gd name="connsiteX2" fmla="*/ 590548 w 1638300"/>
+              <a:gd name="connsiteY2" fmla="*/ 765691 h 1843549"/>
+              <a:gd name="connsiteX3" fmla="*/ 1638300 w 1638300"/>
+              <a:gd name="connsiteY3" fmla="*/ 714891 h 1843549"/>
+              <a:gd name="connsiteX4" fmla="*/ 1638300 w 1638300"/>
+              <a:gd name="connsiteY4" fmla="*/ 1128658 h 1843549"/>
+              <a:gd name="connsiteX5" fmla="*/ 577848 w 1638300"/>
+              <a:gd name="connsiteY5" fmla="*/ 1052458 h 1843549"/>
+              <a:gd name="connsiteX6" fmla="*/ 958848 w 1638300"/>
+              <a:gd name="connsiteY6" fmla="*/ 1843549 h 1843549"/>
+              <a:gd name="connsiteX7" fmla="*/ 0 w 1638300"/>
+              <a:gd name="connsiteY7" fmla="*/ 921775 h 1843549"/>
+              <a:gd name="connsiteX0" fmla="*/ 0 w 2120900"/>
+              <a:gd name="connsiteY0" fmla="*/ 909075 h 1843549"/>
+              <a:gd name="connsiteX1" fmla="*/ 1441448 w 2120900"/>
+              <a:gd name="connsiteY1" fmla="*/ 0 h 1843549"/>
+              <a:gd name="connsiteX2" fmla="*/ 1073148 w 2120900"/>
+              <a:gd name="connsiteY2" fmla="*/ 765691 h 1843549"/>
+              <a:gd name="connsiteX3" fmla="*/ 2120900 w 2120900"/>
+              <a:gd name="connsiteY3" fmla="*/ 714891 h 1843549"/>
+              <a:gd name="connsiteX4" fmla="*/ 2120900 w 2120900"/>
+              <a:gd name="connsiteY4" fmla="*/ 1128658 h 1843549"/>
+              <a:gd name="connsiteX5" fmla="*/ 1060448 w 2120900"/>
+              <a:gd name="connsiteY5" fmla="*/ 1052458 h 1843549"/>
+              <a:gd name="connsiteX6" fmla="*/ 1441448 w 2120900"/>
+              <a:gd name="connsiteY6" fmla="*/ 1843549 h 1843549"/>
+              <a:gd name="connsiteX7" fmla="*/ 0 w 2120900"/>
+              <a:gd name="connsiteY7" fmla="*/ 909075 h 1843549"/>
+              <a:gd name="connsiteX0" fmla="*/ 0 w 2120900"/>
+              <a:gd name="connsiteY0" fmla="*/ 909075 h 1564149"/>
+              <a:gd name="connsiteX1" fmla="*/ 1441448 w 2120900"/>
+              <a:gd name="connsiteY1" fmla="*/ 0 h 1564149"/>
+              <a:gd name="connsiteX2" fmla="*/ 1073148 w 2120900"/>
+              <a:gd name="connsiteY2" fmla="*/ 765691 h 1564149"/>
+              <a:gd name="connsiteX3" fmla="*/ 2120900 w 2120900"/>
+              <a:gd name="connsiteY3" fmla="*/ 714891 h 1564149"/>
+              <a:gd name="connsiteX4" fmla="*/ 2120900 w 2120900"/>
+              <a:gd name="connsiteY4" fmla="*/ 1128658 h 1564149"/>
+              <a:gd name="connsiteX5" fmla="*/ 1060448 w 2120900"/>
+              <a:gd name="connsiteY5" fmla="*/ 1052458 h 1564149"/>
+              <a:gd name="connsiteX6" fmla="*/ 1327148 w 2120900"/>
+              <a:gd name="connsiteY6" fmla="*/ 1564149 h 1564149"/>
+              <a:gd name="connsiteX7" fmla="*/ 0 w 2120900"/>
+              <a:gd name="connsiteY7" fmla="*/ 909075 h 1564149"/>
+              <a:gd name="connsiteX0" fmla="*/ 0 w 2120900"/>
+              <a:gd name="connsiteY0" fmla="*/ 604275 h 1259349"/>
+              <a:gd name="connsiteX1" fmla="*/ 1390648 w 2120900"/>
+              <a:gd name="connsiteY1" fmla="*/ 0 h 1259349"/>
+              <a:gd name="connsiteX2" fmla="*/ 1073148 w 2120900"/>
+              <a:gd name="connsiteY2" fmla="*/ 460891 h 1259349"/>
+              <a:gd name="connsiteX3" fmla="*/ 2120900 w 2120900"/>
+              <a:gd name="connsiteY3" fmla="*/ 410091 h 1259349"/>
+              <a:gd name="connsiteX4" fmla="*/ 2120900 w 2120900"/>
+              <a:gd name="connsiteY4" fmla="*/ 823858 h 1259349"/>
+              <a:gd name="connsiteX5" fmla="*/ 1060448 w 2120900"/>
+              <a:gd name="connsiteY5" fmla="*/ 747658 h 1259349"/>
+              <a:gd name="connsiteX6" fmla="*/ 1327148 w 2120900"/>
+              <a:gd name="connsiteY6" fmla="*/ 1259349 h 1259349"/>
+              <a:gd name="connsiteX7" fmla="*/ 0 w 2120900"/>
+              <a:gd name="connsiteY7" fmla="*/ 604275 h 1259349"/>
+              <a:gd name="connsiteX0" fmla="*/ 0 w 2120900"/>
+              <a:gd name="connsiteY0" fmla="*/ 604275 h 1259349"/>
+              <a:gd name="connsiteX1" fmla="*/ 1390648 w 2120900"/>
+              <a:gd name="connsiteY1" fmla="*/ 0 h 1259349"/>
+              <a:gd name="connsiteX2" fmla="*/ 1073148 w 2120900"/>
+              <a:gd name="connsiteY2" fmla="*/ 460891 h 1259349"/>
+              <a:gd name="connsiteX3" fmla="*/ 1550908 w 2120900"/>
+              <a:gd name="connsiteY3" fmla="*/ 435491 h 1259349"/>
+              <a:gd name="connsiteX4" fmla="*/ 2120900 w 2120900"/>
+              <a:gd name="connsiteY4" fmla="*/ 823858 h 1259349"/>
+              <a:gd name="connsiteX5" fmla="*/ 1060448 w 2120900"/>
+              <a:gd name="connsiteY5" fmla="*/ 747658 h 1259349"/>
+              <a:gd name="connsiteX6" fmla="*/ 1327148 w 2120900"/>
+              <a:gd name="connsiteY6" fmla="*/ 1259349 h 1259349"/>
+              <a:gd name="connsiteX7" fmla="*/ 0 w 2120900"/>
+              <a:gd name="connsiteY7" fmla="*/ 604275 h 1259349"/>
+              <a:gd name="connsiteX0" fmla="*/ 0 w 1577419"/>
+              <a:gd name="connsiteY0" fmla="*/ 604275 h 1259349"/>
+              <a:gd name="connsiteX1" fmla="*/ 1390648 w 1577419"/>
+              <a:gd name="connsiteY1" fmla="*/ 0 h 1259349"/>
+              <a:gd name="connsiteX2" fmla="*/ 1073148 w 1577419"/>
+              <a:gd name="connsiteY2" fmla="*/ 460891 h 1259349"/>
+              <a:gd name="connsiteX3" fmla="*/ 1550908 w 1577419"/>
+              <a:gd name="connsiteY3" fmla="*/ 435491 h 1259349"/>
+              <a:gd name="connsiteX4" fmla="*/ 1577419 w 1577419"/>
+              <a:gd name="connsiteY4" fmla="*/ 773058 h 1259349"/>
+              <a:gd name="connsiteX5" fmla="*/ 1060448 w 1577419"/>
+              <a:gd name="connsiteY5" fmla="*/ 747658 h 1259349"/>
+              <a:gd name="connsiteX6" fmla="*/ 1327148 w 1577419"/>
+              <a:gd name="connsiteY6" fmla="*/ 1259349 h 1259349"/>
+              <a:gd name="connsiteX7" fmla="*/ 0 w 1577419"/>
+              <a:gd name="connsiteY7" fmla="*/ 604275 h 1259349"/>
+              <a:gd name="connsiteX0" fmla="*/ 0 w 1577419"/>
+              <a:gd name="connsiteY0" fmla="*/ 604275 h 1081549"/>
+              <a:gd name="connsiteX1" fmla="*/ 1390648 w 1577419"/>
+              <a:gd name="connsiteY1" fmla="*/ 0 h 1081549"/>
+              <a:gd name="connsiteX2" fmla="*/ 1073148 w 1577419"/>
+              <a:gd name="connsiteY2" fmla="*/ 460891 h 1081549"/>
+              <a:gd name="connsiteX3" fmla="*/ 1550908 w 1577419"/>
+              <a:gd name="connsiteY3" fmla="*/ 435491 h 1081549"/>
+              <a:gd name="connsiteX4" fmla="*/ 1577419 w 1577419"/>
+              <a:gd name="connsiteY4" fmla="*/ 773058 h 1081549"/>
+              <a:gd name="connsiteX5" fmla="*/ 1060448 w 1577419"/>
+              <a:gd name="connsiteY5" fmla="*/ 747658 h 1081549"/>
+              <a:gd name="connsiteX6" fmla="*/ 1207847 w 1577419"/>
+              <a:gd name="connsiteY6" fmla="*/ 1081549 h 1081549"/>
+              <a:gd name="connsiteX7" fmla="*/ 0 w 1577419"/>
+              <a:gd name="connsiteY7" fmla="*/ 604275 h 1081549"/>
+              <a:gd name="connsiteX0" fmla="*/ 0 w 1577419"/>
+              <a:gd name="connsiteY0" fmla="*/ 439175 h 916449"/>
+              <a:gd name="connsiteX1" fmla="*/ 1244836 w 1577419"/>
+              <a:gd name="connsiteY1" fmla="*/ 0 h 916449"/>
+              <a:gd name="connsiteX2" fmla="*/ 1073148 w 1577419"/>
+              <a:gd name="connsiteY2" fmla="*/ 295791 h 916449"/>
+              <a:gd name="connsiteX3" fmla="*/ 1550908 w 1577419"/>
+              <a:gd name="connsiteY3" fmla="*/ 270391 h 916449"/>
+              <a:gd name="connsiteX4" fmla="*/ 1577419 w 1577419"/>
+              <a:gd name="connsiteY4" fmla="*/ 607958 h 916449"/>
+              <a:gd name="connsiteX5" fmla="*/ 1060448 w 1577419"/>
+              <a:gd name="connsiteY5" fmla="*/ 582558 h 916449"/>
+              <a:gd name="connsiteX6" fmla="*/ 1207847 w 1577419"/>
+              <a:gd name="connsiteY6" fmla="*/ 916449 h 916449"/>
+              <a:gd name="connsiteX7" fmla="*/ 0 w 1577419"/>
+              <a:gd name="connsiteY7" fmla="*/ 439175 h 916449"/>
+            </a:gdLst>
+            <a:ahLst/>
+            <a:cxnLst>
+              <a:cxn ang="0">
+                <a:pos x="connsiteX0" y="connsiteY0"/>
+              </a:cxn>
+              <a:cxn ang="0">
+                <a:pos x="connsiteX1" y="connsiteY1"/>
+              </a:cxn>
+              <a:cxn ang="0">
+                <a:pos x="connsiteX2" y="connsiteY2"/>
+              </a:cxn>
+              <a:cxn ang="0">
+                <a:pos x="connsiteX3" y="connsiteY3"/>
+              </a:cxn>
+              <a:cxn ang="0">
+                <a:pos x="connsiteX4" y="connsiteY4"/>
+              </a:cxn>
+              <a:cxn ang="0">
+                <a:pos x="connsiteX5" y="connsiteY5"/>
+              </a:cxn>
+              <a:cxn ang="0">
+                <a:pos x="connsiteX6" y="connsiteY6"/>
+              </a:cxn>
+              <a:cxn ang="0">
+                <a:pos x="connsiteX7" y="connsiteY7"/>
+              </a:cxn>
+            </a:cxnLst>
+            <a:rect l="l" t="t" r="r" b="b"/>
+            <a:pathLst>
+              <a:path w="1577419" h="916449">
+                <a:moveTo>
+                  <a:pt x="0" y="439175"/>
+                </a:moveTo>
+                <a:lnTo>
+                  <a:pt x="1244836" y="0"/>
+                </a:lnTo>
+                <a:lnTo>
+                  <a:pt x="1073148" y="295791"/>
+                </a:lnTo>
+                <a:lnTo>
+                  <a:pt x="1550908" y="270391"/>
+                </a:lnTo>
+                <a:lnTo>
+                  <a:pt x="1577419" y="607958"/>
+                </a:lnTo>
+                <a:lnTo>
+                  <a:pt x="1060448" y="582558"/>
+                </a:lnTo>
+                <a:lnTo>
+                  <a:pt x="1207847" y="916449"/>
+                </a:lnTo>
+                <a:lnTo>
+                  <a:pt x="0" y="439175"/>
+                </a:lnTo>
+                <a:close/>
+              </a:path>
+            </a:pathLst>
+          </a:custGeom>
+          <a:solidFill>
+            <a:schemeClr val="bg1"/>
+          </a:solidFill>
+          <a:ln>
+            <a:solidFill>
+              <a:schemeClr val="tx1"/>
+            </a:solidFill>
+          </a:ln>
+        </p:spPr>
+        <p:style>
+          <a:lnRef idx="2">
+            <a:schemeClr val="accent1">
+              <a:shade val="50000"/>
+            </a:schemeClr>
+          </a:lnRef>
+          <a:fillRef idx="1">
+            <a:schemeClr val="accent1"/>
+          </a:fillRef>
+          <a:effectRef idx="0">
+            <a:schemeClr val="accent1"/>
+          </a:effectRef>
+          <a:fontRef idx="minor">
+            <a:schemeClr val="lt1"/>
+          </a:fontRef>
+        </p:style>
+        <p:txBody>
+          <a:bodyPr rtlCol="0" anchor="ctr"/>
+          <a:lstStyle/>
+          <a:p>
+            <a:pPr algn="ctr"/>
+            <a:endParaRPr lang="zh-CN" altLang="en-US" sz="2000">
+              <a:latin typeface="楷体" panose="02010609060101010101" pitchFamily="49" charset="-122"/>
+              <a:ea typeface="楷体" panose="02010609060101010101" pitchFamily="49" charset="-122"/>
+            </a:endParaRPr>
+          </a:p>
+        </p:txBody>
+      </p:sp>
+      <p:sp>
+        <p:nvSpPr>
+          <p:cNvPr id="12" name="文本框 11">
+            <a:extLst>
+              <a:ext uri="{FF2B5EF4-FFF2-40B4-BE49-F238E27FC236}">
+                <a16:creationId xmlns:a16="http://schemas.microsoft.com/office/drawing/2014/main" id="{EABAD248-1F09-1D4B-8B93-13D61E6DF880}"/>
+              </a:ext>
+            </a:extLst>
+          </p:cNvPr>
+          <p:cNvSpPr txBox="1"/>
+          <p:nvPr/>
+        </p:nvSpPr>
+        <p:spPr>
+          <a:xfrm>
+            <a:off x="2979318" y="5799967"/>
+            <a:ext cx="1415772" cy="307777"/>
+          </a:xfrm>
+          <a:prstGeom prst="rect">
+            <a:avLst/>
+          </a:prstGeom>
+          <a:noFill/>
+        </p:spPr>
+        <p:txBody>
+          <a:bodyPr wrap="none" rtlCol="0">
+            <a:spAutoFit/>
+          </a:bodyPr>
+          <a:lstStyle/>
+          <a:p>
+            <a:r>
+              <a:rPr kumimoji="1" lang="zh-CN" altLang="en-US" sz="1400" b="1" i="1" dirty="0"/>
+              <a:t>第一次点击“狼”</a:t>
+            </a:r>
+          </a:p>
+        </p:txBody>
+      </p:sp>
+      <p:sp>
+        <p:nvSpPr>
+          <p:cNvPr id="57" name="文本框 56">
+            <a:extLst>
+              <a:ext uri="{FF2B5EF4-FFF2-40B4-BE49-F238E27FC236}">
+                <a16:creationId xmlns:a16="http://schemas.microsoft.com/office/drawing/2014/main" id="{B32C80E9-FDC1-474E-AC9B-4C9A0CE8780A}"/>
+              </a:ext>
+            </a:extLst>
+          </p:cNvPr>
+          <p:cNvSpPr txBox="1"/>
+          <p:nvPr/>
+        </p:nvSpPr>
+        <p:spPr>
+          <a:xfrm>
+            <a:off x="7575834" y="5803381"/>
+            <a:ext cx="1415772" cy="307777"/>
+          </a:xfrm>
+          <a:prstGeom prst="rect">
+            <a:avLst/>
+          </a:prstGeom>
+          <a:noFill/>
+        </p:spPr>
+        <p:txBody>
+          <a:bodyPr wrap="none" rtlCol="0">
+            <a:spAutoFit/>
+          </a:bodyPr>
+          <a:lstStyle/>
+          <a:p>
+            <a:r>
+              <a:rPr kumimoji="1" lang="zh-CN" altLang="en-US" sz="1400" b="1" i="1" dirty="0"/>
+              <a:t>第二次点击“羊”</a:t>
+            </a:r>
+          </a:p>
+        </p:txBody>
+      </p:sp>
+      <p:sp>
+        <p:nvSpPr>
+          <p:cNvPr id="20" name="椭圆 19">
+            <a:extLst>
+              <a:ext uri="{FF2B5EF4-FFF2-40B4-BE49-F238E27FC236}">
+                <a16:creationId xmlns:a16="http://schemas.microsoft.com/office/drawing/2014/main" id="{5FA66AD3-163E-4636-B7C9-2CF266A5A2A9}"/>
+              </a:ext>
+            </a:extLst>
+          </p:cNvPr>
+          <p:cNvSpPr/>
+          <p:nvPr/>
+        </p:nvSpPr>
+        <p:spPr>
+          <a:xfrm>
+            <a:off x="3150597" y="4334775"/>
+            <a:ext cx="273014" cy="273014"/>
+          </a:xfrm>
+          <a:prstGeom prst="ellipse">
+            <a:avLst/>
+          </a:prstGeom>
+          <a:solidFill>
+            <a:srgbClr val="7030A0"/>
+          </a:solidFill>
+          <a:ln>
+            <a:noFill/>
+          </a:ln>
+        </p:spPr>
+        <p:style>
+          <a:lnRef idx="2">
+            <a:schemeClr val="accent1">
+              <a:shade val="50000"/>
+            </a:schemeClr>
+          </a:lnRef>
+          <a:fillRef idx="1">
+            <a:schemeClr val="accent1"/>
+          </a:fillRef>
+          <a:effectRef idx="0">
+            <a:schemeClr val="accent1"/>
+          </a:effectRef>
+          <a:fontRef idx="minor">
+            <a:schemeClr val="lt1"/>
+          </a:fontRef>
+        </p:style>
+        <p:txBody>
+          <a:bodyPr rtlCol="0" anchor="ctr"/>
+          <a:lstStyle/>
+          <a:p>
+            <a:pPr algn="ctr"/>
+            <a:endParaRPr kumimoji="1" lang="zh-CN" altLang="en-US"/>
+          </a:p>
+        </p:txBody>
+      </p:sp>
+      <p:sp>
+        <p:nvSpPr>
+          <p:cNvPr id="21" name="椭圆 20">
+            <a:extLst>
+              <a:ext uri="{FF2B5EF4-FFF2-40B4-BE49-F238E27FC236}">
+                <a16:creationId xmlns:a16="http://schemas.microsoft.com/office/drawing/2014/main" id="{C17927E5-7DAF-48B2-8829-25F361657E89}"/>
+              </a:ext>
+            </a:extLst>
+          </p:cNvPr>
+          <p:cNvSpPr/>
+          <p:nvPr/>
+        </p:nvSpPr>
+        <p:spPr>
+          <a:xfrm>
+            <a:off x="7667594" y="4324585"/>
+            <a:ext cx="273014" cy="273014"/>
+          </a:xfrm>
+          <a:prstGeom prst="ellipse">
+            <a:avLst/>
+          </a:prstGeom>
+          <a:solidFill>
+            <a:srgbClr val="7030A0"/>
+          </a:solidFill>
+          <a:ln>
+            <a:noFill/>
+          </a:ln>
+        </p:spPr>
+        <p:style>
+          <a:lnRef idx="2">
+            <a:schemeClr val="accent1">
+              <a:shade val="50000"/>
+            </a:schemeClr>
+          </a:lnRef>
+          <a:fillRef idx="1">
+            <a:schemeClr val="accent1"/>
+          </a:fillRef>
+          <a:effectRef idx="0">
+            <a:schemeClr val="accent1"/>
+          </a:effectRef>
+          <a:fontRef idx="minor">
+            <a:schemeClr val="lt1"/>
+          </a:fontRef>
+        </p:style>
+        <p:txBody>
+          <a:bodyPr rtlCol="0" anchor="ctr"/>
+          <a:lstStyle/>
+          <a:p>
+            <a:pPr algn="ctr"/>
+            <a:endParaRPr kumimoji="1" lang="zh-CN" altLang="en-US"/>
+          </a:p>
+        </p:txBody>
+      </p:sp>
+    </p:spTree>
+    <p:extLst>
+      <p:ext uri="{BB962C8B-B14F-4D97-AF65-F5344CB8AC3E}">
+        <p14:creationId xmlns:p14="http://schemas.microsoft.com/office/powerpoint/2010/main" val="1059006778"/>
+      </p:ext>
+    </p:extLst>
+  </p:cSld>
+  <p:clrMapOvr>
+    <a:masterClrMapping/>
+  </p:clrMapOvr>
+</p:sld>
+</file>
+
+<file path=ppt/slides/slide5.xml><?xml version="1.0" encoding="utf-8"?>
+<p:sld xmlns:a="http://schemas.openxmlformats.org/drawingml/2006/main" xmlns:r="http://schemas.openxmlformats.org/officeDocument/2006/relationships" xmlns:p="http://schemas.openxmlformats.org/presentationml/2006/main">
+  <p:cSld>
+    <p:spTree>
+      <p:nvGrpSpPr>
+        <p:cNvPr id="1" name=""/>
+        <p:cNvGrpSpPr/>
+        <p:nvPr/>
+      </p:nvGrpSpPr>
+      <p:grpSpPr>
+        <a:xfrm>
+          <a:off x="0" y="0"/>
+          <a:ext cx="0" cy="0"/>
+          <a:chOff x="0" y="0"/>
+          <a:chExt cx="0" cy="0"/>
+        </a:xfrm>
+      </p:grpSpPr>
+      <p:pic>
+        <p:nvPicPr>
+          <p:cNvPr id="2" name="图片 1">
+            <a:extLst>
+              <a:ext uri="{FF2B5EF4-FFF2-40B4-BE49-F238E27FC236}">
+                <a16:creationId xmlns:a16="http://schemas.microsoft.com/office/drawing/2014/main" id="{4D988B84-7792-43CE-BD7D-F17F31EB95AD}"/>
+              </a:ext>
+            </a:extLst>
+          </p:cNvPr>
+          <p:cNvPicPr>
+            <a:picLocks noChangeAspect="1"/>
+          </p:cNvPicPr>
+          <p:nvPr/>
+        </p:nvPicPr>
+        <p:blipFill rotWithShape="1">
+          <a:blip r:embed="rId2"/>
+          <a:srcRect l="12270" r="12170"/>
+          <a:stretch/>
+        </p:blipFill>
+        <p:spPr>
+          <a:xfrm>
+            <a:off x="2717800" y="893084"/>
+            <a:ext cx="6256867" cy="4657874"/>
+          </a:xfrm>
+          <a:prstGeom prst="rect">
+            <a:avLst/>
+          </a:prstGeom>
+        </p:spPr>
+      </p:pic>
+    </p:spTree>
+    <p:extLst>
+      <p:ext uri="{BB962C8B-B14F-4D97-AF65-F5344CB8AC3E}">
+        <p14:creationId xmlns:p14="http://schemas.microsoft.com/office/powerpoint/2010/main" val="3330095412"/>
+      </p:ext>
+    </p:extLst>
+  </p:cSld>
+  <p:clrMapOvr>
+    <a:masterClrMapping/>
+  </p:clrMapOvr>
+</p:sld>
+</file>
+
+<file path=ppt/slides/slide6.xml><?xml version="1.0" encoding="utf-8"?>
+<p:sld xmlns:a="http://schemas.openxmlformats.org/drawingml/2006/main" xmlns:r="http://schemas.openxmlformats.org/officeDocument/2006/relationships" xmlns:p="http://schemas.openxmlformats.org/presentationml/2006/main">
+  <p:cSld>
+    <p:spTree>
+      <p:nvGrpSpPr>
+        <p:cNvPr id="1" name=""/>
+        <p:cNvGrpSpPr/>
+        <p:nvPr/>
+      </p:nvGrpSpPr>
+      <p:grpSpPr>
+        <a:xfrm>
+          <a:off x="0" y="0"/>
+          <a:ext cx="0" cy="0"/>
+          <a:chOff x="0" y="0"/>
+          <a:chExt cx="0" cy="0"/>
+        </a:xfrm>
+      </p:grpSpPr>
+      <p:pic>
+        <p:nvPicPr>
+          <p:cNvPr id="2" name="图片 1">
+            <a:extLst>
+              <a:ext uri="{FF2B5EF4-FFF2-40B4-BE49-F238E27FC236}">
+                <a16:creationId xmlns:a16="http://schemas.microsoft.com/office/drawing/2014/main" id="{BDD9E335-997D-4B95-B147-CDCF38F248C9}"/>
+              </a:ext>
+            </a:extLst>
+          </p:cNvPr>
+          <p:cNvPicPr>
+            <a:picLocks noChangeAspect="1"/>
+          </p:cNvPicPr>
+          <p:nvPr/>
+        </p:nvPicPr>
+        <p:blipFill rotWithShape="1">
+          <a:blip r:embed="rId2"/>
+          <a:srcRect l="13060" r="12781"/>
+          <a:stretch/>
+        </p:blipFill>
+        <p:spPr>
+          <a:xfrm>
+            <a:off x="2082800" y="1261236"/>
+            <a:ext cx="6781800" cy="5143946"/>
+          </a:xfrm>
+          <a:prstGeom prst="rect">
+            <a:avLst/>
+          </a:prstGeom>
+        </p:spPr>
+      </p:pic>
+    </p:spTree>
+    <p:extLst>
+      <p:ext uri="{BB962C8B-B14F-4D97-AF65-F5344CB8AC3E}">
+        <p14:creationId xmlns:p14="http://schemas.microsoft.com/office/powerpoint/2010/main" val="588246835"/>
       </p:ext>
     </p:extLst>
   </p:cSld>
@@ -6092,4 +9703,299 @@
     </a:ext>
   </a:extLst>
 </a:theme>
+</file>
+
+<file path=ppt/theme/theme2.xml><?xml version="1.0" encoding="utf-8"?>
+<a:theme xmlns:a="http://schemas.openxmlformats.org/drawingml/2006/main" name="Office 主题​​">
+  <a:themeElements>
+    <a:clrScheme name="Office">
+      <a:dk1>
+        <a:sysClr val="windowText" lastClr="000000"/>
+      </a:dk1>
+      <a:lt1>
+        <a:sysClr val="window" lastClr="FFFFFF"/>
+      </a:lt1>
+      <a:dk2>
+        <a:srgbClr val="44546A"/>
+      </a:dk2>
+      <a:lt2>
+        <a:srgbClr val="E7E6E6"/>
+      </a:lt2>
+      <a:accent1>
+        <a:srgbClr val="4472C4"/>
+      </a:accent1>
+      <a:accent2>
+        <a:srgbClr val="ED7D31"/>
+      </a:accent2>
+      <a:accent3>
+        <a:srgbClr val="A5A5A5"/>
+      </a:accent3>
+      <a:accent4>
+        <a:srgbClr val="FFC000"/>
+      </a:accent4>
+      <a:accent5>
+        <a:srgbClr val="5B9BD5"/>
+      </a:accent5>
+      <a:accent6>
+        <a:srgbClr val="70AD47"/>
+      </a:accent6>
+      <a:hlink>
+        <a:srgbClr val="0563C1"/>
+      </a:hlink>
+      <a:folHlink>
+        <a:srgbClr val="954F72"/>
+      </a:folHlink>
+    </a:clrScheme>
+    <a:fontScheme name="Office">
+      <a:majorFont>
+        <a:latin typeface="等线 Light" panose="020F0302020204030204"/>
+        <a:ea typeface=""/>
+        <a:cs typeface=""/>
+        <a:font script="Jpan" typeface="游ゴシック Light"/>
+        <a:font script="Hang" typeface="맑은 고딕"/>
+        <a:font script="Hans" typeface="等线 Light"/>
+        <a:font script="Hant" typeface="新細明體"/>
+        <a:font script="Arab" typeface="Times New Roman"/>
+        <a:font script="Hebr" typeface="Times New Roman"/>
+        <a:font script="Thai" typeface="Angsana New"/>
+        <a:font script="Ethi" typeface="Nyala"/>
+        <a:font script="Beng" typeface="Vrinda"/>
+        <a:font script="Gujr" typeface="Shruti"/>
+        <a:font script="Khmr" typeface="MoolBoran"/>
+        <a:font script="Knda" typeface="Tunga"/>
+        <a:font script="Guru" typeface="Raavi"/>
+        <a:font script="Cans" typeface="Euphemia"/>
+        <a:font script="Cher" typeface="Plantagenet Cherokee"/>
+        <a:font script="Yiii" typeface="Microsoft Yi Baiti"/>
+        <a:font script="Tibt" typeface="Microsoft Himalaya"/>
+        <a:font script="Thaa" typeface="MV Boli"/>
+        <a:font script="Deva" typeface="Mangal"/>
+        <a:font script="Telu" typeface="Gautami"/>
+        <a:font script="Taml" typeface="Latha"/>
+        <a:font script="Syrc" typeface="Estrangelo Edessa"/>
+        <a:font script="Orya" typeface="Kalinga"/>
+        <a:font script="Mlym" typeface="Kartika"/>
+        <a:font script="Laoo" typeface="DokChampa"/>
+        <a:font script="Sinh" typeface="Iskoola Pota"/>
+        <a:font script="Mong" typeface="Mongolian Baiti"/>
+        <a:font script="Viet" typeface="Times New Roman"/>
+        <a:font script="Uigh" typeface="Microsoft Uighur"/>
+        <a:font script="Geor" typeface="Sylfaen"/>
+        <a:font script="Armn" typeface="Arial"/>
+        <a:font script="Bugi" typeface="Leelawadee UI"/>
+        <a:font script="Bopo" typeface="Microsoft JhengHei"/>
+        <a:font script="Java" typeface="Javanese Text"/>
+        <a:font script="Lisu" typeface="Segoe UI"/>
+        <a:font script="Mymr" typeface="Myanmar Text"/>
+        <a:font script="Nkoo" typeface="Ebrima"/>
+        <a:font script="Olck" typeface="Nirmala UI"/>
+        <a:font script="Osma" typeface="Ebrima"/>
+        <a:font script="Phag" typeface="Phagspa"/>
+        <a:font script="Syrn" typeface="Estrangelo Edessa"/>
+        <a:font script="Syrj" typeface="Estrangelo Edessa"/>
+        <a:font script="Syre" typeface="Estrangelo Edessa"/>
+        <a:font script="Sora" typeface="Nirmala UI"/>
+        <a:font script="Tale" typeface="Microsoft Tai Le"/>
+        <a:font script="Talu" typeface="Microsoft New Tai Lue"/>
+        <a:font script="Tfng" typeface="Ebrima"/>
+      </a:majorFont>
+      <a:minorFont>
+        <a:latin typeface="等线" panose="020F0502020204030204"/>
+        <a:ea typeface=""/>
+        <a:cs typeface=""/>
+        <a:font script="Jpan" typeface="游ゴシック"/>
+        <a:font script="Hang" typeface="맑은 고딕"/>
+        <a:font script="Hans" typeface="等线"/>
+        <a:font script="Hant" typeface="新細明體"/>
+        <a:font script="Arab" typeface="Arial"/>
+        <a:font script="Hebr" typeface="Arial"/>
+        <a:font script="Thai" typeface="Cordia New"/>
+        <a:font script="Ethi" typeface="Nyala"/>
+        <a:font script="Beng" typeface="Vrinda"/>
+        <a:font script="Gujr" typeface="Shruti"/>
+        <a:font script="Khmr" typeface="DaunPenh"/>
+        <a:font script="Knda" typeface="Tunga"/>
+        <a:font script="Guru" typeface="Raavi"/>
+        <a:font script="Cans" typeface="Euphemia"/>
+        <a:font script="Cher" typeface="Plantagenet Cherokee"/>
+        <a:font script="Yiii" typeface="Microsoft Yi Baiti"/>
+        <a:font script="Tibt" typeface="Microsoft Himalaya"/>
+        <a:font script="Thaa" typeface="MV Boli"/>
+        <a:font script="Deva" typeface="Mangal"/>
+        <a:font script="Telu" typeface="Gautami"/>
+        <a:font script="Taml" typeface="Latha"/>
+        <a:font script="Syrc" typeface="Estrangelo Edessa"/>
+        <a:font script="Orya" typeface="Kalinga"/>
+        <a:font script="Mlym" typeface="Kartika"/>
+        <a:font script="Laoo" typeface="DokChampa"/>
+        <a:font script="Sinh" typeface="Iskoola Pota"/>
+        <a:font script="Mong" typeface="Mongolian Baiti"/>
+        <a:font script="Viet" typeface="Arial"/>
+        <a:font script="Uigh" typeface="Microsoft Uighur"/>
+        <a:font script="Geor" typeface="Sylfaen"/>
+        <a:font script="Armn" typeface="Arial"/>
+        <a:font script="Bugi" typeface="Leelawadee UI"/>
+        <a:font script="Bopo" typeface="Microsoft JhengHei"/>
+        <a:font script="Java" typeface="Javanese Text"/>
+        <a:font script="Lisu" typeface="Segoe UI"/>
+        <a:font script="Mymr" typeface="Myanmar Text"/>
+        <a:font script="Nkoo" typeface="Ebrima"/>
+        <a:font script="Olck" typeface="Nirmala UI"/>
+        <a:font script="Osma" typeface="Ebrima"/>
+        <a:font script="Phag" typeface="Phagspa"/>
+        <a:font script="Syrn" typeface="Estrangelo Edessa"/>
+        <a:font script="Syrj" typeface="Estrangelo Edessa"/>
+        <a:font script="Syre" typeface="Estrangelo Edessa"/>
+        <a:font script="Sora" typeface="Nirmala UI"/>
+        <a:font script="Tale" typeface="Microsoft Tai Le"/>
+        <a:font script="Talu" typeface="Microsoft New Tai Lue"/>
+        <a:font script="Tfng" typeface="Ebrima"/>
+      </a:minorFont>
+    </a:fontScheme>
+    <a:fmtScheme name="Office">
+      <a:fillStyleLst>
+        <a:solidFill>
+          <a:schemeClr val="phClr"/>
+        </a:solidFill>
+        <a:gradFill rotWithShape="1">
+          <a:gsLst>
+            <a:gs pos="0">
+              <a:schemeClr val="phClr">
+                <a:lumMod val="110000"/>
+                <a:satMod val="105000"/>
+                <a:tint val="67000"/>
+              </a:schemeClr>
+            </a:gs>
+            <a:gs pos="50000">
+              <a:schemeClr val="phClr">
+                <a:lumMod val="105000"/>
+                <a:satMod val="103000"/>
+                <a:tint val="73000"/>
+              </a:schemeClr>
+            </a:gs>
+            <a:gs pos="100000">
+              <a:schemeClr val="phClr">
+                <a:lumMod val="105000"/>
+                <a:satMod val="109000"/>
+                <a:tint val="81000"/>
+              </a:schemeClr>
+            </a:gs>
+          </a:gsLst>
+          <a:lin ang="5400000" scaled="0"/>
+        </a:gradFill>
+        <a:gradFill rotWithShape="1">
+          <a:gsLst>
+            <a:gs pos="0">
+              <a:schemeClr val="phClr">
+                <a:satMod val="103000"/>
+                <a:lumMod val="102000"/>
+                <a:tint val="94000"/>
+              </a:schemeClr>
+            </a:gs>
+            <a:gs pos="50000">
+              <a:schemeClr val="phClr">
+                <a:satMod val="110000"/>
+                <a:lumMod val="100000"/>
+                <a:shade val="100000"/>
+              </a:schemeClr>
+            </a:gs>
+            <a:gs pos="100000">
+              <a:schemeClr val="phClr">
+                <a:lumMod val="99000"/>
+                <a:satMod val="120000"/>
+                <a:shade val="78000"/>
+              </a:schemeClr>
+            </a:gs>
+          </a:gsLst>
+          <a:lin ang="5400000" scaled="0"/>
+        </a:gradFill>
+      </a:fillStyleLst>
+      <a:lnStyleLst>
+        <a:ln w="6350" cap="flat" cmpd="sng" algn="ctr">
+          <a:solidFill>
+            <a:schemeClr val="phClr"/>
+          </a:solidFill>
+          <a:prstDash val="solid"/>
+          <a:miter lim="800000"/>
+        </a:ln>
+        <a:ln w="12700" cap="flat" cmpd="sng" algn="ctr">
+          <a:solidFill>
+            <a:schemeClr val="phClr"/>
+          </a:solidFill>
+          <a:prstDash val="solid"/>
+          <a:miter lim="800000"/>
+        </a:ln>
+        <a:ln w="19050" cap="flat" cmpd="sng" algn="ctr">
+          <a:solidFill>
+            <a:schemeClr val="phClr"/>
+          </a:solidFill>
+          <a:prstDash val="solid"/>
+          <a:miter lim="800000"/>
+        </a:ln>
+      </a:lnStyleLst>
+      <a:effectStyleLst>
+        <a:effectStyle>
+          <a:effectLst/>
+        </a:effectStyle>
+        <a:effectStyle>
+          <a:effectLst/>
+        </a:effectStyle>
+        <a:effectStyle>
+          <a:effectLst>
+            <a:outerShdw blurRad="57150" dist="19050" dir="5400000" algn="ctr" rotWithShape="0">
+              <a:srgbClr val="000000">
+                <a:alpha val="63000"/>
+              </a:srgbClr>
+            </a:outerShdw>
+          </a:effectLst>
+        </a:effectStyle>
+      </a:effectStyleLst>
+      <a:bgFillStyleLst>
+        <a:solidFill>
+          <a:schemeClr val="phClr"/>
+        </a:solidFill>
+        <a:solidFill>
+          <a:schemeClr val="phClr">
+            <a:tint val="95000"/>
+            <a:satMod val="170000"/>
+          </a:schemeClr>
+        </a:solidFill>
+        <a:gradFill rotWithShape="1">
+          <a:gsLst>
+            <a:gs pos="0">
+              <a:schemeClr val="phClr">
+                <a:tint val="93000"/>
+                <a:satMod val="150000"/>
+                <a:shade val="98000"/>
+                <a:lumMod val="102000"/>
+              </a:schemeClr>
+            </a:gs>
+            <a:gs pos="50000">
+              <a:schemeClr val="phClr">
+                <a:tint val="98000"/>
+                <a:satMod val="130000"/>
+                <a:shade val="90000"/>
+                <a:lumMod val="103000"/>
+              </a:schemeClr>
+            </a:gs>
+            <a:gs pos="100000">
+              <a:schemeClr val="phClr">
+                <a:shade val="63000"/>
+                <a:satMod val="120000"/>
+              </a:schemeClr>
+            </a:gs>
+          </a:gsLst>
+          <a:lin ang="5400000" scaled="0"/>
+        </a:gradFill>
+      </a:bgFillStyleLst>
+    </a:fmtScheme>
+  </a:themeElements>
+  <a:objectDefaults/>
+  <a:extraClrSchemeLst/>
+  <a:extLst>
+    <a:ext uri="{05A4C25C-085E-4340-85A3-A5531E510DB2}">
+      <thm15:themeFamily xmlns:thm15="http://schemas.microsoft.com/office/thememl/2012/main" name="Office Theme" id="{62F939B6-93AF-4DB8-9C6B-D6C7DFDC589F}" vid="{4A3C46E8-61CC-4603-A589-7422A47A8E4A}"/>
+    </a:ext>
+  </a:extLst>
+</a:theme>
 </file>
</xml_diff>

<commit_message>
faster stimulus load (prescale Trajectory beform exp)
</commit_message>
<xml_diff>
--- a/exec/chasingDetectionIntroduction.pptx
+++ b/exec/chasingDetectionIntroduction.pptx
@@ -7937,7 +7937,7 @@
             </a:r>
             <a:r>
               <a:rPr kumimoji="1" lang="en-US" altLang="zh-CN" dirty="0"/>
-              <a:t>10</a:t>
+              <a:t>20</a:t>
             </a:r>
             <a:r>
               <a:rPr kumimoji="1" lang="zh-CN" altLang="en-US" dirty="0"/>
@@ -7945,7 +7945,7 @@
             </a:r>
             <a:r>
               <a:rPr kumimoji="1" lang="en-US" altLang="zh-CN" dirty="0"/>
-              <a:t>10</a:t>
+              <a:t>20</a:t>
             </a:r>
             <a:r>
               <a:rPr kumimoji="1" lang="zh-CN" altLang="en-US" dirty="0"/>
@@ -9370,10 +9370,10 @@
       </p:grpSpPr>
       <p:pic>
         <p:nvPicPr>
-          <p:cNvPr id="2" name="图片 1">
+          <p:cNvPr id="3" name="图片 2">
             <a:extLst>
               <a:ext uri="{FF2B5EF4-FFF2-40B4-BE49-F238E27FC236}">
-                <a16:creationId xmlns:a16="http://schemas.microsoft.com/office/drawing/2014/main" id="{BDD9E335-997D-4B95-B147-CDCF38F248C9}"/>
+                <a16:creationId xmlns:a16="http://schemas.microsoft.com/office/drawing/2014/main" id="{37FA757F-CC3E-4356-B145-EFA49D1126A0}"/>
               </a:ext>
             </a:extLst>
           </p:cNvPr>
@@ -9384,13 +9384,13 @@
         </p:nvPicPr>
         <p:blipFill rotWithShape="1">
           <a:blip r:embed="rId2"/>
-          <a:srcRect l="13060" r="12781"/>
+          <a:srcRect l="13062" r="12382"/>
           <a:stretch/>
         </p:blipFill>
         <p:spPr>
           <a:xfrm>
-            <a:off x="2082800" y="1261236"/>
-            <a:ext cx="6781800" cy="5143946"/>
+            <a:off x="1819919" y="59982"/>
+            <a:ext cx="8930939" cy="6738035"/>
           </a:xfrm>
           <a:prstGeom prst="rect">
             <a:avLst/>

</xml_diff>

<commit_message>
add feedback for practice
</commit_message>
<xml_diff>
--- a/exec/chasingDetectionIntroduction.pptx
+++ b/exec/chasingDetectionIntroduction.pptx
@@ -5,7 +5,7 @@
     <p:sldMasterId id="2147483648" r:id="rId1"/>
   </p:sldMasterIdLst>
   <p:notesMasterIdLst>
-    <p:notesMasterId r:id="rId8"/>
+    <p:notesMasterId r:id="rId9"/>
   </p:notesMasterIdLst>
   <p:sldIdLst>
     <p:sldId id="272" r:id="rId2"/>
@@ -14,6 +14,7 @@
     <p:sldId id="275" r:id="rId5"/>
     <p:sldId id="276" r:id="rId6"/>
     <p:sldId id="277" r:id="rId7"/>
+    <p:sldId id="278" r:id="rId8"/>
   </p:sldIdLst>
   <p:sldSz cx="12192000" cy="6858000"/>
   <p:notesSz cx="6858000" cy="9144000"/>
@@ -127,6 +128,7 @@
             <p14:sldId id="275"/>
             <p14:sldId id="276"/>
             <p14:sldId id="277"/>
+            <p14:sldId id="278"/>
           </p14:sldIdLst>
         </p14:section>
       </p14:sectionLst>
@@ -231,7 +233,7 @@
           <a:p>
             <a:fld id="{CFF59C98-C9BD-41F7-80CC-38D3607D3299}" type="datetimeFigureOut">
               <a:rPr lang="zh-CN" altLang="en-US" smtClean="0"/>
-              <a:t>2019/8/26</a:t>
+              <a:t>2019/8/27</a:t>
             </a:fld>
             <a:endParaRPr lang="zh-CN" altLang="en-US"/>
           </a:p>
@@ -813,7 +815,7 @@
           <a:p>
             <a:fld id="{597785CE-28E9-41AA-907C-478FE12C818B}" type="datetimeFigureOut">
               <a:rPr lang="zh-CN" altLang="en-US" smtClean="0"/>
-              <a:t>2019/8/26</a:t>
+              <a:t>2019/8/27</a:t>
             </a:fld>
             <a:endParaRPr lang="zh-CN" altLang="en-US"/>
           </a:p>
@@ -1011,7 +1013,7 @@
           <a:p>
             <a:fld id="{597785CE-28E9-41AA-907C-478FE12C818B}" type="datetimeFigureOut">
               <a:rPr lang="zh-CN" altLang="en-US" smtClean="0"/>
-              <a:t>2019/8/26</a:t>
+              <a:t>2019/8/27</a:t>
             </a:fld>
             <a:endParaRPr lang="zh-CN" altLang="en-US"/>
           </a:p>
@@ -1219,7 +1221,7 @@
           <a:p>
             <a:fld id="{597785CE-28E9-41AA-907C-478FE12C818B}" type="datetimeFigureOut">
               <a:rPr lang="zh-CN" altLang="en-US" smtClean="0"/>
-              <a:t>2019/8/26</a:t>
+              <a:t>2019/8/27</a:t>
             </a:fld>
             <a:endParaRPr lang="zh-CN" altLang="en-US"/>
           </a:p>
@@ -1417,7 +1419,7 @@
           <a:p>
             <a:fld id="{597785CE-28E9-41AA-907C-478FE12C818B}" type="datetimeFigureOut">
               <a:rPr lang="zh-CN" altLang="en-US" smtClean="0"/>
-              <a:t>2019/8/26</a:t>
+              <a:t>2019/8/27</a:t>
             </a:fld>
             <a:endParaRPr lang="zh-CN" altLang="en-US"/>
           </a:p>
@@ -1692,7 +1694,7 @@
           <a:p>
             <a:fld id="{597785CE-28E9-41AA-907C-478FE12C818B}" type="datetimeFigureOut">
               <a:rPr lang="zh-CN" altLang="en-US" smtClean="0"/>
-              <a:t>2019/8/26</a:t>
+              <a:t>2019/8/27</a:t>
             </a:fld>
             <a:endParaRPr lang="zh-CN" altLang="en-US"/>
           </a:p>
@@ -1957,7 +1959,7 @@
           <a:p>
             <a:fld id="{597785CE-28E9-41AA-907C-478FE12C818B}" type="datetimeFigureOut">
               <a:rPr lang="zh-CN" altLang="en-US" smtClean="0"/>
-              <a:t>2019/8/26</a:t>
+              <a:t>2019/8/27</a:t>
             </a:fld>
             <a:endParaRPr lang="zh-CN" altLang="en-US"/>
           </a:p>
@@ -2369,7 +2371,7 @@
           <a:p>
             <a:fld id="{597785CE-28E9-41AA-907C-478FE12C818B}" type="datetimeFigureOut">
               <a:rPr lang="zh-CN" altLang="en-US" smtClean="0"/>
-              <a:t>2019/8/26</a:t>
+              <a:t>2019/8/27</a:t>
             </a:fld>
             <a:endParaRPr lang="zh-CN" altLang="en-US"/>
           </a:p>
@@ -2510,7 +2512,7 @@
           <a:p>
             <a:fld id="{597785CE-28E9-41AA-907C-478FE12C818B}" type="datetimeFigureOut">
               <a:rPr lang="zh-CN" altLang="en-US" smtClean="0"/>
-              <a:t>2019/8/26</a:t>
+              <a:t>2019/8/27</a:t>
             </a:fld>
             <a:endParaRPr lang="zh-CN" altLang="en-US"/>
           </a:p>
@@ -2623,7 +2625,7 @@
           <a:p>
             <a:fld id="{597785CE-28E9-41AA-907C-478FE12C818B}" type="datetimeFigureOut">
               <a:rPr lang="zh-CN" altLang="en-US" smtClean="0"/>
-              <a:t>2019/8/26</a:t>
+              <a:t>2019/8/27</a:t>
             </a:fld>
             <a:endParaRPr lang="zh-CN" altLang="en-US"/>
           </a:p>
@@ -2934,7 +2936,7 @@
           <a:p>
             <a:fld id="{597785CE-28E9-41AA-907C-478FE12C818B}" type="datetimeFigureOut">
               <a:rPr lang="zh-CN" altLang="en-US" smtClean="0"/>
-              <a:t>2019/8/26</a:t>
+              <a:t>2019/8/27</a:t>
             </a:fld>
             <a:endParaRPr lang="zh-CN" altLang="en-US"/>
           </a:p>
@@ -3222,7 +3224,7 @@
           <a:p>
             <a:fld id="{597785CE-28E9-41AA-907C-478FE12C818B}" type="datetimeFigureOut">
               <a:rPr lang="zh-CN" altLang="en-US" smtClean="0"/>
-              <a:t>2019/8/26</a:t>
+              <a:t>2019/8/27</a:t>
             </a:fld>
             <a:endParaRPr lang="zh-CN" altLang="en-US"/>
           </a:p>
@@ -3463,7 +3465,7 @@
           <a:p>
             <a:fld id="{597785CE-28E9-41AA-907C-478FE12C818B}" type="datetimeFigureOut">
               <a:rPr lang="zh-CN" altLang="en-US" smtClean="0"/>
-              <a:t>2019/8/26</a:t>
+              <a:t>2019/8/27</a:t>
             </a:fld>
             <a:endParaRPr lang="zh-CN" altLang="en-US"/>
           </a:p>
@@ -9410,6 +9412,149 @@
 </p:sld>
 </file>
 
+<file path=ppt/slides/slide7.xml><?xml version="1.0" encoding="utf-8"?>
+<p:sld xmlns:a="http://schemas.openxmlformats.org/drawingml/2006/main" xmlns:r="http://schemas.openxmlformats.org/officeDocument/2006/relationships" xmlns:p="http://schemas.openxmlformats.org/presentationml/2006/main">
+  <p:cSld>
+    <p:spTree>
+      <p:nvGrpSpPr>
+        <p:cNvPr id="1" name=""/>
+        <p:cNvGrpSpPr/>
+        <p:nvPr/>
+      </p:nvGrpSpPr>
+      <p:grpSpPr>
+        <a:xfrm>
+          <a:off x="0" y="0"/>
+          <a:ext cx="0" cy="0"/>
+          <a:chOff x="0" y="0"/>
+          <a:chExt cx="0" cy="0"/>
+        </a:xfrm>
+      </p:grpSpPr>
+      <p:sp>
+        <p:nvSpPr>
+          <p:cNvPr id="2" name="十字形 1">
+            <a:extLst>
+              <a:ext uri="{FF2B5EF4-FFF2-40B4-BE49-F238E27FC236}">
+                <a16:creationId xmlns:a16="http://schemas.microsoft.com/office/drawing/2014/main" id="{B8406C41-F5E5-4D9D-B218-F76FA7B10288}"/>
+              </a:ext>
+            </a:extLst>
+          </p:cNvPr>
+          <p:cNvSpPr/>
+          <p:nvPr/>
+        </p:nvSpPr>
+        <p:spPr>
+          <a:xfrm rot="2710368">
+            <a:off x="5253103" y="2660674"/>
+            <a:ext cx="1685794" cy="1692847"/>
+          </a:xfrm>
+          <a:prstGeom prst="plus">
+            <a:avLst>
+              <a:gd name="adj" fmla="val 41318"/>
+            </a:avLst>
+          </a:prstGeom>
+          <a:solidFill>
+            <a:srgbClr val="FF0000"/>
+          </a:solidFill>
+          <a:ln>
+            <a:solidFill>
+              <a:srgbClr val="FF0000"/>
+            </a:solidFill>
+          </a:ln>
+        </p:spPr>
+        <p:style>
+          <a:lnRef idx="2">
+            <a:schemeClr val="accent1">
+              <a:shade val="50000"/>
+            </a:schemeClr>
+          </a:lnRef>
+          <a:fillRef idx="1">
+            <a:schemeClr val="accent1"/>
+          </a:fillRef>
+          <a:effectRef idx="0">
+            <a:schemeClr val="accent1"/>
+          </a:effectRef>
+          <a:fontRef idx="minor">
+            <a:schemeClr val="lt1"/>
+          </a:fontRef>
+        </p:style>
+        <p:txBody>
+          <a:bodyPr rtlCol="0" anchor="ctr"/>
+          <a:lstStyle/>
+          <a:p>
+            <a:pPr algn="ctr"/>
+            <a:endParaRPr lang="zh-CN" altLang="en-US"/>
+          </a:p>
+        </p:txBody>
+      </p:sp>
+      <p:sp>
+        <p:nvSpPr>
+          <p:cNvPr id="3" name="L 形 2">
+            <a:extLst>
+              <a:ext uri="{FF2B5EF4-FFF2-40B4-BE49-F238E27FC236}">
+                <a16:creationId xmlns:a16="http://schemas.microsoft.com/office/drawing/2014/main" id="{4D79792A-1DBC-46B1-ADB5-E86430567C93}"/>
+              </a:ext>
+            </a:extLst>
+          </p:cNvPr>
+          <p:cNvSpPr/>
+          <p:nvPr/>
+        </p:nvSpPr>
+        <p:spPr>
+          <a:xfrm rot="18905393">
+            <a:off x="5533574" y="2778759"/>
+            <a:ext cx="1355218" cy="1057321"/>
+          </a:xfrm>
+          <a:prstGeom prst="corner">
+            <a:avLst>
+              <a:gd name="adj1" fmla="val 29303"/>
+              <a:gd name="adj2" fmla="val 29204"/>
+            </a:avLst>
+          </a:prstGeom>
+          <a:solidFill>
+            <a:srgbClr val="00B050"/>
+          </a:solidFill>
+          <a:ln>
+            <a:solidFill>
+              <a:srgbClr val="00B050"/>
+            </a:solidFill>
+          </a:ln>
+        </p:spPr>
+        <p:style>
+          <a:lnRef idx="2">
+            <a:schemeClr val="accent1">
+              <a:shade val="50000"/>
+            </a:schemeClr>
+          </a:lnRef>
+          <a:fillRef idx="1">
+            <a:schemeClr val="accent1"/>
+          </a:fillRef>
+          <a:effectRef idx="0">
+            <a:schemeClr val="accent1"/>
+          </a:effectRef>
+          <a:fontRef idx="minor">
+            <a:schemeClr val="lt1"/>
+          </a:fontRef>
+        </p:style>
+        <p:txBody>
+          <a:bodyPr rtlCol="0" anchor="ctr"/>
+          <a:lstStyle/>
+          <a:p>
+            <a:pPr algn="ctr"/>
+            <a:endParaRPr lang="zh-CN" altLang="en-US"/>
+          </a:p>
+        </p:txBody>
+      </p:sp>
+    </p:spTree>
+    <p:extLst>
+      <p:ext uri="{BB962C8B-B14F-4D97-AF65-F5344CB8AC3E}">
+        <p14:creationId xmlns:p14="http://schemas.microsoft.com/office/powerpoint/2010/main" val="281702006"/>
+      </p:ext>
+    </p:extLst>
+  </p:cSld>
+  <p:clrMapOvr>
+    <a:masterClrMapping/>
+  </p:clrMapOvr>
+</p:sld>
+</file>
+
 <file path=ppt/theme/theme1.xml><?xml version="1.0" encoding="utf-8"?>
 <a:theme xmlns:a="http://schemas.openxmlformats.org/drawingml/2006/main" name="Office 主题​​">
   <a:themeElements>

</xml_diff>